<commit_message>
update add more content
</commit_message>
<xml_diff>
--- a/PowerPoint/PLC programming - Part 1 - Problems with Large Programs and Solution.pptx
+++ b/PowerPoint/PLC programming - Part 1 - Problems with Large Programs and Solution.pptx
@@ -10,11 +10,14 @@
     <p:sldId id="275" r:id="rId4"/>
     <p:sldId id="268" r:id="rId5"/>
     <p:sldId id="266" r:id="rId6"/>
-    <p:sldId id="269" r:id="rId7"/>
-    <p:sldId id="274" r:id="rId8"/>
-    <p:sldId id="270" r:id="rId9"/>
-    <p:sldId id="272" r:id="rId10"/>
-    <p:sldId id="273" r:id="rId11"/>
+    <p:sldId id="276" r:id="rId7"/>
+    <p:sldId id="269" r:id="rId8"/>
+    <p:sldId id="274" r:id="rId9"/>
+    <p:sldId id="270" r:id="rId10"/>
+    <p:sldId id="277" r:id="rId11"/>
+    <p:sldId id="272" r:id="rId12"/>
+    <p:sldId id="273" r:id="rId13"/>
+    <p:sldId id="278" r:id="rId14"/>
   </p:sldIdLst>
   <p:sldSz cx="12192000" cy="6858000"/>
   <p:notesSz cx="6858000" cy="9144000"/>
@@ -171,7 +174,7 @@
           <a:noFill/>
           <a:extLst>
             <a:ext uri="{909E8E84-426E-40dd-AFC4-6F175D3DCCD1}">
-              <a14:hiddenFill xmlns:a14="http://schemas.microsoft.com/office/drawing/2010/main" xmlns="">
+              <a14:hiddenFill xmlns="" xmlns:a14="http://schemas.microsoft.com/office/drawing/2010/main">
                 <a:solidFill>
                   <a:srgbClr val="FFFFFF"/>
                 </a:solidFill>
@@ -231,7 +234,7 @@
             </a:ln>
             <a:extLst>
               <a:ext uri="{91240B29-F687-4f45-9708-019B960494DF}">
-                <a14:hiddenLine xmlns:a14="http://schemas.microsoft.com/office/drawing/2010/main" xmlns="" w="9525">
+                <a14:hiddenLine xmlns="" xmlns:a14="http://schemas.microsoft.com/office/drawing/2010/main" w="9525">
                   <a:solidFill>
                     <a:srgbClr val="000000"/>
                   </a:solidFill>
@@ -321,7 +324,7 @@
             </a:ln>
             <a:extLst>
               <a:ext uri="{91240B29-F687-4f45-9708-019B960494DF}">
-                <a14:hiddenLine xmlns:a14="http://schemas.microsoft.com/office/drawing/2010/main" xmlns="" w="9525">
+                <a14:hiddenLine xmlns="" xmlns:a14="http://schemas.microsoft.com/office/drawing/2010/main" w="9525">
                   <a:solidFill>
                     <a:srgbClr val="000000"/>
                   </a:solidFill>
@@ -411,7 +414,7 @@
             </a:ln>
             <a:extLst>
               <a:ext uri="{91240B29-F687-4f45-9708-019B960494DF}">
-                <a14:hiddenLine xmlns:a14="http://schemas.microsoft.com/office/drawing/2010/main" xmlns="" w="9525">
+                <a14:hiddenLine xmlns="" xmlns:a14="http://schemas.microsoft.com/office/drawing/2010/main" w="9525">
                   <a:solidFill>
                     <a:srgbClr val="000000"/>
                   </a:solidFill>
@@ -445,7 +448,7 @@
             </a:ln>
             <a:extLst>
               <a:ext uri="{91240B29-F687-4f45-9708-019B960494DF}">
-                <a14:hiddenLine xmlns:a14="http://schemas.microsoft.com/office/drawing/2010/main" xmlns="" w="9525">
+                <a14:hiddenLine xmlns="" xmlns:a14="http://schemas.microsoft.com/office/drawing/2010/main" w="9525">
                   <a:solidFill>
                     <a:srgbClr val="000000"/>
                   </a:solidFill>
@@ -535,7 +538,7 @@
             </a:ln>
             <a:extLst>
               <a:ext uri="{91240B29-F687-4f45-9708-019B960494DF}">
-                <a14:hiddenLine xmlns:a14="http://schemas.microsoft.com/office/drawing/2010/main" xmlns="" w="9525">
+                <a14:hiddenLine xmlns="" xmlns:a14="http://schemas.microsoft.com/office/drawing/2010/main" w="9525">
                   <a:solidFill>
                     <a:srgbClr val="000000"/>
                   </a:solidFill>
@@ -597,7 +600,7 @@
             </a:ln>
             <a:extLst>
               <a:ext uri="{91240B29-F687-4f45-9708-019B960494DF}">
-                <a14:hiddenLine xmlns:a14="http://schemas.microsoft.com/office/drawing/2010/main" xmlns="" w="9525">
+                <a14:hiddenLine xmlns="" xmlns:a14="http://schemas.microsoft.com/office/drawing/2010/main" w="9525">
                   <a:solidFill>
                     <a:srgbClr val="000000"/>
                   </a:solidFill>
@@ -659,7 +662,7 @@
             </a:ln>
             <a:extLst>
               <a:ext uri="{91240B29-F687-4f45-9708-019B960494DF}">
-                <a14:hiddenLine xmlns:a14="http://schemas.microsoft.com/office/drawing/2010/main" xmlns="" w="9525">
+                <a14:hiddenLine xmlns="" xmlns:a14="http://schemas.microsoft.com/office/drawing/2010/main" w="9525">
                   <a:solidFill>
                     <a:srgbClr val="000000"/>
                   </a:solidFill>
@@ -749,7 +752,7 @@
             </a:ln>
             <a:extLst>
               <a:ext uri="{91240B29-F687-4f45-9708-019B960494DF}">
-                <a14:hiddenLine xmlns:a14="http://schemas.microsoft.com/office/drawing/2010/main" xmlns="" w="9525">
+                <a14:hiddenLine xmlns="" xmlns:a14="http://schemas.microsoft.com/office/drawing/2010/main" w="9525">
                   <a:solidFill>
                     <a:srgbClr val="000000"/>
                   </a:solidFill>
@@ -811,7 +814,7 @@
             </a:ln>
             <a:extLst>
               <a:ext uri="{91240B29-F687-4f45-9708-019B960494DF}">
-                <a14:hiddenLine xmlns:a14="http://schemas.microsoft.com/office/drawing/2010/main" xmlns="" w="9525">
+                <a14:hiddenLine xmlns="" xmlns:a14="http://schemas.microsoft.com/office/drawing/2010/main" w="9525">
                   <a:solidFill>
                     <a:srgbClr val="000000"/>
                   </a:solidFill>
@@ -873,7 +876,7 @@
             </a:ln>
             <a:extLst>
               <a:ext uri="{91240B29-F687-4f45-9708-019B960494DF}">
-                <a14:hiddenLine xmlns:a14="http://schemas.microsoft.com/office/drawing/2010/main" xmlns="" w="9525">
+                <a14:hiddenLine xmlns="" xmlns:a14="http://schemas.microsoft.com/office/drawing/2010/main" w="9525">
                   <a:solidFill>
                     <a:srgbClr val="000000"/>
                   </a:solidFill>
@@ -963,7 +966,7 @@
             </a:ln>
             <a:extLst>
               <a:ext uri="{91240B29-F687-4f45-9708-019B960494DF}">
-                <a14:hiddenLine xmlns:a14="http://schemas.microsoft.com/office/drawing/2010/main" xmlns="" w="9525">
+                <a14:hiddenLine xmlns="" xmlns:a14="http://schemas.microsoft.com/office/drawing/2010/main" w="9525">
                   <a:solidFill>
                     <a:srgbClr val="000000"/>
                   </a:solidFill>
@@ -1053,7 +1056,7 @@
             </a:ln>
             <a:extLst>
               <a:ext uri="{91240B29-F687-4f45-9708-019B960494DF}">
-                <a14:hiddenLine xmlns:a14="http://schemas.microsoft.com/office/drawing/2010/main" xmlns="" w="9525">
+                <a14:hiddenLine xmlns="" xmlns:a14="http://schemas.microsoft.com/office/drawing/2010/main" w="9525">
                   <a:solidFill>
                     <a:srgbClr val="000000"/>
                   </a:solidFill>
@@ -1115,7 +1118,7 @@
             </a:ln>
             <a:extLst>
               <a:ext uri="{91240B29-F687-4f45-9708-019B960494DF}">
-                <a14:hiddenLine xmlns:a14="http://schemas.microsoft.com/office/drawing/2010/main" xmlns="" w="9525">
+                <a14:hiddenLine xmlns="" xmlns:a14="http://schemas.microsoft.com/office/drawing/2010/main" w="9525">
                   <a:solidFill>
                     <a:srgbClr val="000000"/>
                   </a:solidFill>
@@ -1225,7 +1228,7 @@
             </a:ln>
             <a:extLst>
               <a:ext uri="{91240B29-F687-4f45-9708-019B960494DF}">
-                <a14:hiddenLine xmlns:a14="http://schemas.microsoft.com/office/drawing/2010/main" xmlns="" w="9525">
+                <a14:hiddenLine xmlns="" xmlns:a14="http://schemas.microsoft.com/office/drawing/2010/main" w="9525">
                   <a:solidFill>
                     <a:srgbClr val="000000"/>
                   </a:solidFill>
@@ -1287,7 +1290,7 @@
             </a:ln>
             <a:extLst>
               <a:ext uri="{91240B29-F687-4f45-9708-019B960494DF}">
-                <a14:hiddenLine xmlns:a14="http://schemas.microsoft.com/office/drawing/2010/main" xmlns="" w="9525">
+                <a14:hiddenLine xmlns="" xmlns:a14="http://schemas.microsoft.com/office/drawing/2010/main" w="9525">
                   <a:solidFill>
                     <a:srgbClr val="000000"/>
                   </a:solidFill>
@@ -1377,7 +1380,7 @@
             </a:ln>
             <a:extLst>
               <a:ext uri="{91240B29-F687-4f45-9708-019B960494DF}">
-                <a14:hiddenLine xmlns:a14="http://schemas.microsoft.com/office/drawing/2010/main" xmlns="" w="9525">
+                <a14:hiddenLine xmlns="" xmlns:a14="http://schemas.microsoft.com/office/drawing/2010/main" w="9525">
                   <a:solidFill>
                     <a:srgbClr val="000000"/>
                   </a:solidFill>
@@ -1467,7 +1470,7 @@
             </a:ln>
             <a:extLst>
               <a:ext uri="{91240B29-F687-4f45-9708-019B960494DF}">
-                <a14:hiddenLine xmlns:a14="http://schemas.microsoft.com/office/drawing/2010/main" xmlns="" w="9525">
+                <a14:hiddenLine xmlns="" xmlns:a14="http://schemas.microsoft.com/office/drawing/2010/main" w="9525">
                   <a:solidFill>
                     <a:srgbClr val="000000"/>
                   </a:solidFill>
@@ -1529,7 +1532,7 @@
             </a:ln>
             <a:extLst>
               <a:ext uri="{91240B29-F687-4f45-9708-019B960494DF}">
-                <a14:hiddenLine xmlns:a14="http://schemas.microsoft.com/office/drawing/2010/main" xmlns="" w="9525">
+                <a14:hiddenLine xmlns="" xmlns:a14="http://schemas.microsoft.com/office/drawing/2010/main" w="9525">
                   <a:solidFill>
                     <a:srgbClr val="000000"/>
                   </a:solidFill>
@@ -1619,7 +1622,7 @@
             </a:ln>
             <a:extLst>
               <a:ext uri="{91240B29-F687-4f45-9708-019B960494DF}">
-                <a14:hiddenLine xmlns:a14="http://schemas.microsoft.com/office/drawing/2010/main" xmlns="" w="9525">
+                <a14:hiddenLine xmlns="" xmlns:a14="http://schemas.microsoft.com/office/drawing/2010/main" w="9525">
                   <a:solidFill>
                     <a:srgbClr val="000000"/>
                   </a:solidFill>
@@ -1709,7 +1712,7 @@
             </a:ln>
             <a:extLst>
               <a:ext uri="{91240B29-F687-4f45-9708-019B960494DF}">
-                <a14:hiddenLine xmlns:a14="http://schemas.microsoft.com/office/drawing/2010/main" xmlns="" w="9525">
+                <a14:hiddenLine xmlns="" xmlns:a14="http://schemas.microsoft.com/office/drawing/2010/main" w="9525">
                   <a:solidFill>
                     <a:srgbClr val="000000"/>
                   </a:solidFill>
@@ -1765,7 +1768,7 @@
             </a:ln>
             <a:extLst>
               <a:ext uri="{91240B29-F687-4f45-9708-019B960494DF}">
-                <a14:hiddenLine xmlns:a14="http://schemas.microsoft.com/office/drawing/2010/main" xmlns="" w="9525">
+                <a14:hiddenLine xmlns="" xmlns:a14="http://schemas.microsoft.com/office/drawing/2010/main" w="9525">
                   <a:solidFill>
                     <a:srgbClr val="000000"/>
                   </a:solidFill>
@@ -1855,7 +1858,7 @@
             </a:ln>
             <a:extLst>
               <a:ext uri="{91240B29-F687-4f45-9708-019B960494DF}">
-                <a14:hiddenLine xmlns:a14="http://schemas.microsoft.com/office/drawing/2010/main" xmlns="" w="9525">
+                <a14:hiddenLine xmlns="" xmlns:a14="http://schemas.microsoft.com/office/drawing/2010/main" w="9525">
                   <a:solidFill>
                     <a:srgbClr val="000000"/>
                   </a:solidFill>
@@ -1911,7 +1914,7 @@
             </a:ln>
             <a:extLst>
               <a:ext uri="{91240B29-F687-4f45-9708-019B960494DF}">
-                <a14:hiddenLine xmlns:a14="http://schemas.microsoft.com/office/drawing/2010/main" xmlns="" w="9525">
+                <a14:hiddenLine xmlns="" xmlns:a14="http://schemas.microsoft.com/office/drawing/2010/main" w="9525">
                   <a:solidFill>
                     <a:srgbClr val="000000"/>
                   </a:solidFill>
@@ -2001,7 +2004,7 @@
             </a:ln>
             <a:extLst>
               <a:ext uri="{91240B29-F687-4f45-9708-019B960494DF}">
-                <a14:hiddenLine xmlns:a14="http://schemas.microsoft.com/office/drawing/2010/main" xmlns="" w="9525">
+                <a14:hiddenLine xmlns="" xmlns:a14="http://schemas.microsoft.com/office/drawing/2010/main" w="9525">
                   <a:solidFill>
                     <a:srgbClr val="000000"/>
                   </a:solidFill>
@@ -2069,7 +2072,7 @@
             </a:ln>
             <a:extLst>
               <a:ext uri="{91240B29-F687-4f45-9708-019B960494DF}">
-                <a14:hiddenLine xmlns:a14="http://schemas.microsoft.com/office/drawing/2010/main" xmlns="" w="9525">
+                <a14:hiddenLine xmlns="" xmlns:a14="http://schemas.microsoft.com/office/drawing/2010/main" w="9525">
                   <a:solidFill>
                     <a:srgbClr val="000000"/>
                   </a:solidFill>
@@ -2159,7 +2162,7 @@
             </a:ln>
             <a:extLst>
               <a:ext uri="{91240B29-F687-4f45-9708-019B960494DF}">
-                <a14:hiddenLine xmlns:a14="http://schemas.microsoft.com/office/drawing/2010/main" xmlns="" w="9525">
+                <a14:hiddenLine xmlns="" xmlns:a14="http://schemas.microsoft.com/office/drawing/2010/main" w="9525">
                   <a:solidFill>
                     <a:srgbClr val="000000"/>
                   </a:solidFill>
@@ -2227,7 +2230,7 @@
             </a:ln>
             <a:extLst>
               <a:ext uri="{91240B29-F687-4f45-9708-019B960494DF}">
-                <a14:hiddenLine xmlns:a14="http://schemas.microsoft.com/office/drawing/2010/main" xmlns="" w="9525">
+                <a14:hiddenLine xmlns="" xmlns:a14="http://schemas.microsoft.com/office/drawing/2010/main" w="9525">
                   <a:solidFill>
                     <a:srgbClr val="000000"/>
                   </a:solidFill>
@@ -2317,7 +2320,7 @@
             </a:ln>
             <a:extLst>
               <a:ext uri="{91240B29-F687-4f45-9708-019B960494DF}">
-                <a14:hiddenLine xmlns:a14="http://schemas.microsoft.com/office/drawing/2010/main" xmlns="" w="9525">
+                <a14:hiddenLine xmlns="" xmlns:a14="http://schemas.microsoft.com/office/drawing/2010/main" w="9525">
                   <a:solidFill>
                     <a:srgbClr val="000000"/>
                   </a:solidFill>
@@ -2351,7 +2354,7 @@
             </a:ln>
             <a:extLst>
               <a:ext uri="{91240B29-F687-4f45-9708-019B960494DF}">
-                <a14:hiddenLine xmlns:a14="http://schemas.microsoft.com/office/drawing/2010/main" xmlns="" w="9525">
+                <a14:hiddenLine xmlns="" xmlns:a14="http://schemas.microsoft.com/office/drawing/2010/main" w="9525">
                   <a:solidFill>
                     <a:srgbClr val="000000"/>
                   </a:solidFill>
@@ -2441,7 +2444,7 @@
             </a:ln>
             <a:extLst>
               <a:ext uri="{91240B29-F687-4f45-9708-019B960494DF}">
-                <a14:hiddenLine xmlns:a14="http://schemas.microsoft.com/office/drawing/2010/main" xmlns="" w="9525">
+                <a14:hiddenLine xmlns="" xmlns:a14="http://schemas.microsoft.com/office/drawing/2010/main" w="9525">
                   <a:solidFill>
                     <a:srgbClr val="000000"/>
                   </a:solidFill>
@@ -2503,7 +2506,7 @@
             </a:ln>
             <a:extLst>
               <a:ext uri="{91240B29-F687-4f45-9708-019B960494DF}">
-                <a14:hiddenLine xmlns:a14="http://schemas.microsoft.com/office/drawing/2010/main" xmlns="" w="9525">
+                <a14:hiddenLine xmlns="" xmlns:a14="http://schemas.microsoft.com/office/drawing/2010/main" w="9525">
                   <a:solidFill>
                     <a:srgbClr val="000000"/>
                   </a:solidFill>
@@ -2565,7 +2568,7 @@
             </a:ln>
             <a:extLst>
               <a:ext uri="{91240B29-F687-4f45-9708-019B960494DF}">
-                <a14:hiddenLine xmlns:a14="http://schemas.microsoft.com/office/drawing/2010/main" xmlns="" w="9525">
+                <a14:hiddenLine xmlns="" xmlns:a14="http://schemas.microsoft.com/office/drawing/2010/main" w="9525">
                   <a:solidFill>
                     <a:srgbClr val="000000"/>
                   </a:solidFill>
@@ -2655,7 +2658,7 @@
             </a:ln>
             <a:extLst>
               <a:ext uri="{91240B29-F687-4f45-9708-019B960494DF}">
-                <a14:hiddenLine xmlns:a14="http://schemas.microsoft.com/office/drawing/2010/main" xmlns="" w="9525">
+                <a14:hiddenLine xmlns="" xmlns:a14="http://schemas.microsoft.com/office/drawing/2010/main" w="9525">
                   <a:solidFill>
                     <a:srgbClr val="000000"/>
                   </a:solidFill>
@@ -2723,7 +2726,7 @@
             </a:ln>
             <a:extLst>
               <a:ext uri="{91240B29-F687-4f45-9708-019B960494DF}">
-                <a14:hiddenLine xmlns:a14="http://schemas.microsoft.com/office/drawing/2010/main" xmlns="" w="9525">
+                <a14:hiddenLine xmlns="" xmlns:a14="http://schemas.microsoft.com/office/drawing/2010/main" w="9525">
                   <a:solidFill>
                     <a:srgbClr val="000000"/>
                   </a:solidFill>
@@ -2785,7 +2788,7 @@
             </a:ln>
             <a:extLst>
               <a:ext uri="{91240B29-F687-4f45-9708-019B960494DF}">
-                <a14:hiddenLine xmlns:a14="http://schemas.microsoft.com/office/drawing/2010/main" xmlns="" w="9525">
+                <a14:hiddenLine xmlns="" xmlns:a14="http://schemas.microsoft.com/office/drawing/2010/main" w="9525">
                   <a:solidFill>
                     <a:srgbClr val="000000"/>
                   </a:solidFill>
@@ -2875,7 +2878,7 @@
             </a:ln>
             <a:extLst>
               <a:ext uri="{91240B29-F687-4f45-9708-019B960494DF}">
-                <a14:hiddenLine xmlns:a14="http://schemas.microsoft.com/office/drawing/2010/main" xmlns="" w="9525">
+                <a14:hiddenLine xmlns="" xmlns:a14="http://schemas.microsoft.com/office/drawing/2010/main" w="9525">
                   <a:solidFill>
                     <a:srgbClr val="000000"/>
                   </a:solidFill>
@@ -2937,7 +2940,7 @@
             </a:ln>
             <a:extLst>
               <a:ext uri="{91240B29-F687-4f45-9708-019B960494DF}">
-                <a14:hiddenLine xmlns:a14="http://schemas.microsoft.com/office/drawing/2010/main" xmlns="" w="9525">
+                <a14:hiddenLine xmlns="" xmlns:a14="http://schemas.microsoft.com/office/drawing/2010/main" w="9525">
                   <a:solidFill>
                     <a:srgbClr val="000000"/>
                   </a:solidFill>
@@ -3027,7 +3030,7 @@
             </a:ln>
             <a:extLst>
               <a:ext uri="{91240B29-F687-4f45-9708-019B960494DF}">
-                <a14:hiddenLine xmlns:a14="http://schemas.microsoft.com/office/drawing/2010/main" xmlns="" w="9525">
+                <a14:hiddenLine xmlns="" xmlns:a14="http://schemas.microsoft.com/office/drawing/2010/main" w="9525">
                   <a:solidFill>
                     <a:srgbClr val="000000"/>
                   </a:solidFill>
@@ -3089,7 +3092,7 @@
             </a:ln>
             <a:extLst>
               <a:ext uri="{91240B29-F687-4f45-9708-019B960494DF}">
-                <a14:hiddenLine xmlns:a14="http://schemas.microsoft.com/office/drawing/2010/main" xmlns="" w="9525">
+                <a14:hiddenLine xmlns="" xmlns:a14="http://schemas.microsoft.com/office/drawing/2010/main" w="9525">
                   <a:solidFill>
                     <a:srgbClr val="000000"/>
                   </a:solidFill>
@@ -3179,7 +3182,7 @@
             </a:ln>
             <a:extLst>
               <a:ext uri="{91240B29-F687-4f45-9708-019B960494DF}">
-                <a14:hiddenLine xmlns:a14="http://schemas.microsoft.com/office/drawing/2010/main" xmlns="" w="9525">
+                <a14:hiddenLine xmlns="" xmlns:a14="http://schemas.microsoft.com/office/drawing/2010/main" w="9525">
                   <a:solidFill>
                     <a:srgbClr val="000000"/>
                   </a:solidFill>
@@ -3213,7 +3216,7 @@
             </a:ln>
             <a:extLst>
               <a:ext uri="{91240B29-F687-4f45-9708-019B960494DF}">
-                <a14:hiddenLine xmlns:a14="http://schemas.microsoft.com/office/drawing/2010/main" xmlns="" w="9525">
+                <a14:hiddenLine xmlns="" xmlns:a14="http://schemas.microsoft.com/office/drawing/2010/main" w="9525">
                   <a:solidFill>
                     <a:srgbClr val="000000"/>
                   </a:solidFill>
@@ -3278,7 +3281,7 @@
             </a:ln>
             <a:extLst>
               <a:ext uri="{91240B29-F687-4f45-9708-019B960494DF}">
-                <a14:hiddenLine xmlns:a14="http://schemas.microsoft.com/office/drawing/2010/main" xmlns="" w="9525">
+                <a14:hiddenLine xmlns="" xmlns:a14="http://schemas.microsoft.com/office/drawing/2010/main" w="9525">
                   <a:solidFill>
                     <a:srgbClr val="000000"/>
                   </a:solidFill>
@@ -3368,7 +3371,7 @@
             </a:ln>
             <a:extLst>
               <a:ext uri="{91240B29-F687-4f45-9708-019B960494DF}">
-                <a14:hiddenLine xmlns:a14="http://schemas.microsoft.com/office/drawing/2010/main" xmlns="" w="9525">
+                <a14:hiddenLine xmlns="" xmlns:a14="http://schemas.microsoft.com/office/drawing/2010/main" w="9525">
                   <a:solidFill>
                     <a:srgbClr val="000000"/>
                   </a:solidFill>
@@ -3430,7 +3433,7 @@
             </a:ln>
             <a:extLst>
               <a:ext uri="{91240B29-F687-4f45-9708-019B960494DF}">
-                <a14:hiddenLine xmlns:a14="http://schemas.microsoft.com/office/drawing/2010/main" xmlns="" w="9525">
+                <a14:hiddenLine xmlns="" xmlns:a14="http://schemas.microsoft.com/office/drawing/2010/main" w="9525">
                   <a:solidFill>
                     <a:srgbClr val="000000"/>
                   </a:solidFill>
@@ -3520,7 +3523,7 @@
             </a:ln>
             <a:extLst>
               <a:ext uri="{91240B29-F687-4f45-9708-019B960494DF}">
-                <a14:hiddenLine xmlns:a14="http://schemas.microsoft.com/office/drawing/2010/main" xmlns="" w="9525">
+                <a14:hiddenLine xmlns="" xmlns:a14="http://schemas.microsoft.com/office/drawing/2010/main" w="9525">
                   <a:solidFill>
                     <a:srgbClr val="000000"/>
                   </a:solidFill>
@@ -3610,7 +3613,7 @@
             </a:ln>
             <a:extLst>
               <a:ext uri="{91240B29-F687-4f45-9708-019B960494DF}">
-                <a14:hiddenLine xmlns:a14="http://schemas.microsoft.com/office/drawing/2010/main" xmlns="" w="9525">
+                <a14:hiddenLine xmlns="" xmlns:a14="http://schemas.microsoft.com/office/drawing/2010/main" w="9525">
                   <a:solidFill>
                     <a:srgbClr val="000000"/>
                   </a:solidFill>
@@ -3675,7 +3678,7 @@
             </a:ln>
             <a:extLst>
               <a:ext uri="{91240B29-F687-4f45-9708-019B960494DF}">
-                <a14:hiddenLine xmlns:a14="http://schemas.microsoft.com/office/drawing/2010/main" xmlns="" w="9525">
+                <a14:hiddenLine xmlns="" xmlns:a14="http://schemas.microsoft.com/office/drawing/2010/main" w="9525">
                   <a:solidFill>
                     <a:srgbClr val="000000"/>
                   </a:solidFill>
@@ -3737,7 +3740,7 @@
             </a:ln>
             <a:extLst>
               <a:ext uri="{91240B29-F687-4f45-9708-019B960494DF}">
-                <a14:hiddenLine xmlns:a14="http://schemas.microsoft.com/office/drawing/2010/main" xmlns="" w="9525">
+                <a14:hiddenLine xmlns="" xmlns:a14="http://schemas.microsoft.com/office/drawing/2010/main" w="9525">
                   <a:solidFill>
                     <a:srgbClr val="000000"/>
                   </a:solidFill>
@@ -3827,7 +3830,7 @@
             </a:ln>
             <a:extLst>
               <a:ext uri="{91240B29-F687-4f45-9708-019B960494DF}">
-                <a14:hiddenLine xmlns:a14="http://schemas.microsoft.com/office/drawing/2010/main" xmlns="" w="9525">
+                <a14:hiddenLine xmlns="" xmlns:a14="http://schemas.microsoft.com/office/drawing/2010/main" w="9525">
                   <a:solidFill>
                     <a:srgbClr val="000000"/>
                   </a:solidFill>
@@ -3917,7 +3920,7 @@
             </a:ln>
             <a:extLst>
               <a:ext uri="{91240B29-F687-4f45-9708-019B960494DF}">
-                <a14:hiddenLine xmlns:a14="http://schemas.microsoft.com/office/drawing/2010/main" xmlns="" w="9525">
+                <a14:hiddenLine xmlns="" xmlns:a14="http://schemas.microsoft.com/office/drawing/2010/main" w="9525">
                   <a:solidFill>
                     <a:srgbClr val="000000"/>
                   </a:solidFill>
@@ -3979,7 +3982,7 @@
             </a:ln>
             <a:extLst>
               <a:ext uri="{91240B29-F687-4f45-9708-019B960494DF}">
-                <a14:hiddenLine xmlns:a14="http://schemas.microsoft.com/office/drawing/2010/main" xmlns="" w="9525">
+                <a14:hiddenLine xmlns="" xmlns:a14="http://schemas.microsoft.com/office/drawing/2010/main" w="9525">
                   <a:solidFill>
                     <a:srgbClr val="000000"/>
                   </a:solidFill>
@@ -4099,7 +4102,7 @@
             </a:ln>
             <a:extLst>
               <a:ext uri="{91240B29-F687-4f45-9708-019B960494DF}">
-                <a14:hiddenLine xmlns:a14="http://schemas.microsoft.com/office/drawing/2010/main" xmlns="" w="9525">
+                <a14:hiddenLine xmlns="" xmlns:a14="http://schemas.microsoft.com/office/drawing/2010/main" w="9525">
                   <a:solidFill>
                     <a:srgbClr val="000000"/>
                   </a:solidFill>
@@ -4167,7 +4170,7 @@
             </a:ln>
             <a:extLst>
               <a:ext uri="{91240B29-F687-4f45-9708-019B960494DF}">
-                <a14:hiddenLine xmlns:a14="http://schemas.microsoft.com/office/drawing/2010/main" xmlns="" w="9525">
+                <a14:hiddenLine xmlns="" xmlns:a14="http://schemas.microsoft.com/office/drawing/2010/main" w="9525">
                   <a:solidFill>
                     <a:srgbClr val="000000"/>
                   </a:solidFill>
@@ -4257,7 +4260,7 @@
             </a:ln>
             <a:extLst>
               <a:ext uri="{91240B29-F687-4f45-9708-019B960494DF}">
-                <a14:hiddenLine xmlns:a14="http://schemas.microsoft.com/office/drawing/2010/main" xmlns="" w="9525">
+                <a14:hiddenLine xmlns="" xmlns:a14="http://schemas.microsoft.com/office/drawing/2010/main" w="9525">
                   <a:solidFill>
                     <a:srgbClr val="000000"/>
                   </a:solidFill>
@@ -8979,7 +8982,7 @@
           <a:noFill/>
           <a:extLst>
             <a:ext uri="{909E8E84-426E-40dd-AFC4-6F175D3DCCD1}">
-              <a14:hiddenFill xmlns:a14="http://schemas.microsoft.com/office/drawing/2010/main" xmlns="">
+              <a14:hiddenFill xmlns="" xmlns:a14="http://schemas.microsoft.com/office/drawing/2010/main">
                 <a:solidFill>
                   <a:srgbClr val="FFFFFF"/>
                 </a:solidFill>
@@ -9053,7 +9056,7 @@
               </a:ln>
               <a:extLst>
                 <a:ext uri="{91240B29-F687-4f45-9708-019B960494DF}">
-                  <a14:hiddenLine xmlns:a14="http://schemas.microsoft.com/office/drawing/2010/main" xmlns="" w="9525">
+                  <a14:hiddenLine xmlns="" xmlns:a14="http://schemas.microsoft.com/office/drawing/2010/main" w="9525">
                     <a:solidFill>
                       <a:srgbClr val="000000"/>
                     </a:solidFill>
@@ -9143,7 +9146,7 @@
               </a:ln>
               <a:extLst>
                 <a:ext uri="{91240B29-F687-4f45-9708-019B960494DF}">
-                  <a14:hiddenLine xmlns:a14="http://schemas.microsoft.com/office/drawing/2010/main" xmlns="" w="9525">
+                  <a14:hiddenLine xmlns="" xmlns:a14="http://schemas.microsoft.com/office/drawing/2010/main" w="9525">
                     <a:solidFill>
                       <a:srgbClr val="000000"/>
                     </a:solidFill>
@@ -9233,7 +9236,7 @@
               </a:ln>
               <a:extLst>
                 <a:ext uri="{91240B29-F687-4f45-9708-019B960494DF}">
-                  <a14:hiddenLine xmlns:a14="http://schemas.microsoft.com/office/drawing/2010/main" xmlns="" w="9525">
+                  <a14:hiddenLine xmlns="" xmlns:a14="http://schemas.microsoft.com/office/drawing/2010/main" w="9525">
                     <a:solidFill>
                       <a:srgbClr val="000000"/>
                     </a:solidFill>
@@ -9295,7 +9298,7 @@
               </a:ln>
               <a:extLst>
                 <a:ext uri="{91240B29-F687-4f45-9708-019B960494DF}">
-                  <a14:hiddenLine xmlns:a14="http://schemas.microsoft.com/office/drawing/2010/main" xmlns="" w="9525">
+                  <a14:hiddenLine xmlns="" xmlns:a14="http://schemas.microsoft.com/office/drawing/2010/main" w="9525">
                     <a:solidFill>
                       <a:srgbClr val="000000"/>
                     </a:solidFill>
@@ -9385,7 +9388,7 @@
               </a:ln>
               <a:extLst>
                 <a:ext uri="{91240B29-F687-4f45-9708-019B960494DF}">
-                  <a14:hiddenLine xmlns:a14="http://schemas.microsoft.com/office/drawing/2010/main" xmlns="" w="9525">
+                  <a14:hiddenLine xmlns="" xmlns:a14="http://schemas.microsoft.com/office/drawing/2010/main" w="9525">
                     <a:solidFill>
                       <a:srgbClr val="000000"/>
                     </a:solidFill>
@@ -9447,7 +9450,7 @@
               </a:ln>
               <a:extLst>
                 <a:ext uri="{91240B29-F687-4f45-9708-019B960494DF}">
-                  <a14:hiddenLine xmlns:a14="http://schemas.microsoft.com/office/drawing/2010/main" xmlns="" w="9525">
+                  <a14:hiddenLine xmlns="" xmlns:a14="http://schemas.microsoft.com/office/drawing/2010/main" w="9525">
                     <a:solidFill>
                       <a:srgbClr val="000000"/>
                     </a:solidFill>
@@ -9509,7 +9512,7 @@
               </a:ln>
               <a:extLst>
                 <a:ext uri="{91240B29-F687-4f45-9708-019B960494DF}">
-                  <a14:hiddenLine xmlns:a14="http://schemas.microsoft.com/office/drawing/2010/main" xmlns="" w="9525">
+                  <a14:hiddenLine xmlns="" xmlns:a14="http://schemas.microsoft.com/office/drawing/2010/main" w="9525">
                     <a:solidFill>
                       <a:srgbClr val="000000"/>
                     </a:solidFill>
@@ -9599,7 +9602,7 @@
               </a:ln>
               <a:extLst>
                 <a:ext uri="{91240B29-F687-4f45-9708-019B960494DF}">
-                  <a14:hiddenLine xmlns:a14="http://schemas.microsoft.com/office/drawing/2010/main" xmlns="" w="9525">
+                  <a14:hiddenLine xmlns="" xmlns:a14="http://schemas.microsoft.com/office/drawing/2010/main" w="9525">
                     <a:solidFill>
                       <a:srgbClr val="000000"/>
                     </a:solidFill>
@@ -9689,7 +9692,7 @@
               </a:ln>
               <a:extLst>
                 <a:ext uri="{91240B29-F687-4f45-9708-019B960494DF}">
-                  <a14:hiddenLine xmlns:a14="http://schemas.microsoft.com/office/drawing/2010/main" xmlns="" w="9525">
+                  <a14:hiddenLine xmlns="" xmlns:a14="http://schemas.microsoft.com/office/drawing/2010/main" w="9525">
                     <a:solidFill>
                       <a:srgbClr val="000000"/>
                     </a:solidFill>
@@ -9751,7 +9754,7 @@
               </a:ln>
               <a:extLst>
                 <a:ext uri="{91240B29-F687-4f45-9708-019B960494DF}">
-                  <a14:hiddenLine xmlns:a14="http://schemas.microsoft.com/office/drawing/2010/main" xmlns="" w="9525">
+                  <a14:hiddenLine xmlns="" xmlns:a14="http://schemas.microsoft.com/office/drawing/2010/main" w="9525">
                     <a:solidFill>
                       <a:srgbClr val="000000"/>
                     </a:solidFill>
@@ -9861,7 +9864,7 @@
               </a:ln>
               <a:extLst>
                 <a:ext uri="{91240B29-F687-4f45-9708-019B960494DF}">
-                  <a14:hiddenLine xmlns:a14="http://schemas.microsoft.com/office/drawing/2010/main" xmlns="" w="9525">
+                  <a14:hiddenLine xmlns="" xmlns:a14="http://schemas.microsoft.com/office/drawing/2010/main" w="9525">
                     <a:solidFill>
                       <a:srgbClr val="000000"/>
                     </a:solidFill>
@@ -9945,7 +9948,7 @@
               </a:ln>
               <a:extLst>
                 <a:ext uri="{91240B29-F687-4f45-9708-019B960494DF}">
-                  <a14:hiddenLine xmlns:a14="http://schemas.microsoft.com/office/drawing/2010/main" xmlns="" w="9525">
+                  <a14:hiddenLine xmlns="" xmlns:a14="http://schemas.microsoft.com/office/drawing/2010/main" w="9525">
                     <a:solidFill>
                       <a:srgbClr val="000000"/>
                     </a:solidFill>
@@ -10007,7 +10010,7 @@
               </a:ln>
               <a:extLst>
                 <a:ext uri="{91240B29-F687-4f45-9708-019B960494DF}">
-                  <a14:hiddenLine xmlns:a14="http://schemas.microsoft.com/office/drawing/2010/main" xmlns="" w="9525">
+                  <a14:hiddenLine xmlns="" xmlns:a14="http://schemas.microsoft.com/office/drawing/2010/main" w="9525">
                     <a:solidFill>
                       <a:srgbClr val="000000"/>
                     </a:solidFill>
@@ -10069,7 +10072,7 @@
               </a:ln>
               <a:extLst>
                 <a:ext uri="{91240B29-F687-4f45-9708-019B960494DF}">
-                  <a14:hiddenLine xmlns:a14="http://schemas.microsoft.com/office/drawing/2010/main" xmlns="" w="9525">
+                  <a14:hiddenLine xmlns="" xmlns:a14="http://schemas.microsoft.com/office/drawing/2010/main" w="9525">
                     <a:solidFill>
                       <a:srgbClr val="000000"/>
                     </a:solidFill>
@@ -10159,7 +10162,7 @@
               </a:ln>
               <a:extLst>
                 <a:ext uri="{91240B29-F687-4f45-9708-019B960494DF}">
-                  <a14:hiddenLine xmlns:a14="http://schemas.microsoft.com/office/drawing/2010/main" xmlns="" w="9525">
+                  <a14:hiddenLine xmlns="" xmlns:a14="http://schemas.microsoft.com/office/drawing/2010/main" w="9525">
                     <a:solidFill>
                       <a:srgbClr val="000000"/>
                     </a:solidFill>
@@ -10193,7 +10196,7 @@
               </a:ln>
               <a:extLst>
                 <a:ext uri="{91240B29-F687-4f45-9708-019B960494DF}">
-                  <a14:hiddenLine xmlns:a14="http://schemas.microsoft.com/office/drawing/2010/main" xmlns="" w="9525">
+                  <a14:hiddenLine xmlns="" xmlns:a14="http://schemas.microsoft.com/office/drawing/2010/main" w="9525">
                     <a:solidFill>
                       <a:srgbClr val="000000"/>
                     </a:solidFill>
@@ -10258,7 +10261,7 @@
               </a:ln>
               <a:extLst>
                 <a:ext uri="{91240B29-F687-4f45-9708-019B960494DF}">
-                  <a14:hiddenLine xmlns:a14="http://schemas.microsoft.com/office/drawing/2010/main" xmlns="" w="9525">
+                  <a14:hiddenLine xmlns="" xmlns:a14="http://schemas.microsoft.com/office/drawing/2010/main" w="9525">
                     <a:solidFill>
                       <a:srgbClr val="000000"/>
                     </a:solidFill>
@@ -10348,7 +10351,7 @@
               </a:ln>
               <a:extLst>
                 <a:ext uri="{91240B29-F687-4f45-9708-019B960494DF}">
-                  <a14:hiddenLine xmlns:a14="http://schemas.microsoft.com/office/drawing/2010/main" xmlns="" w="9525">
+                  <a14:hiddenLine xmlns="" xmlns:a14="http://schemas.microsoft.com/office/drawing/2010/main" w="9525">
                     <a:solidFill>
                       <a:srgbClr val="000000"/>
                     </a:solidFill>
@@ -10410,7 +10413,7 @@
               </a:ln>
               <a:extLst>
                 <a:ext uri="{91240B29-F687-4f45-9708-019B960494DF}">
-                  <a14:hiddenLine xmlns:a14="http://schemas.microsoft.com/office/drawing/2010/main" xmlns="" w="9525">
+                  <a14:hiddenLine xmlns="" xmlns:a14="http://schemas.microsoft.com/office/drawing/2010/main" w="9525">
                     <a:solidFill>
                       <a:srgbClr val="000000"/>
                     </a:solidFill>
@@ -10500,7 +10503,7 @@
               </a:ln>
               <a:extLst>
                 <a:ext uri="{91240B29-F687-4f45-9708-019B960494DF}">
-                  <a14:hiddenLine xmlns:a14="http://schemas.microsoft.com/office/drawing/2010/main" xmlns="" w="9525">
+                  <a14:hiddenLine xmlns="" xmlns:a14="http://schemas.microsoft.com/office/drawing/2010/main" w="9525">
                     <a:solidFill>
                       <a:srgbClr val="000000"/>
                     </a:solidFill>
@@ -10565,7 +10568,7 @@
               </a:ln>
               <a:extLst>
                 <a:ext uri="{91240B29-F687-4f45-9708-019B960494DF}">
-                  <a14:hiddenLine xmlns:a14="http://schemas.microsoft.com/office/drawing/2010/main" xmlns="" w="9525">
+                  <a14:hiddenLine xmlns="" xmlns:a14="http://schemas.microsoft.com/office/drawing/2010/main" w="9525">
                     <a:solidFill>
                       <a:srgbClr val="000000"/>
                     </a:solidFill>
@@ -10627,7 +10630,7 @@
               </a:ln>
               <a:extLst>
                 <a:ext uri="{91240B29-F687-4f45-9708-019B960494DF}">
-                  <a14:hiddenLine xmlns:a14="http://schemas.microsoft.com/office/drawing/2010/main" xmlns="" w="9525">
+                  <a14:hiddenLine xmlns="" xmlns:a14="http://schemas.microsoft.com/office/drawing/2010/main" w="9525">
                     <a:solidFill>
                       <a:srgbClr val="000000"/>
                     </a:solidFill>
@@ -10717,7 +10720,7 @@
               </a:ln>
               <a:extLst>
                 <a:ext uri="{91240B29-F687-4f45-9708-019B960494DF}">
-                  <a14:hiddenLine xmlns:a14="http://schemas.microsoft.com/office/drawing/2010/main" xmlns="" w="9525">
+                  <a14:hiddenLine xmlns="" xmlns:a14="http://schemas.microsoft.com/office/drawing/2010/main" w="9525">
                     <a:solidFill>
                       <a:srgbClr val="000000"/>
                     </a:solidFill>
@@ -10807,7 +10810,7 @@
               </a:ln>
               <a:extLst>
                 <a:ext uri="{91240B29-F687-4f45-9708-019B960494DF}">
-                  <a14:hiddenLine xmlns:a14="http://schemas.microsoft.com/office/drawing/2010/main" xmlns="" w="9525">
+                  <a14:hiddenLine xmlns="" xmlns:a14="http://schemas.microsoft.com/office/drawing/2010/main" w="9525">
                     <a:solidFill>
                       <a:srgbClr val="000000"/>
                     </a:solidFill>
@@ -10872,7 +10875,7 @@
               </a:ln>
               <a:extLst>
                 <a:ext uri="{91240B29-F687-4f45-9708-019B960494DF}">
-                  <a14:hiddenLine xmlns:a14="http://schemas.microsoft.com/office/drawing/2010/main" xmlns="" w="9525">
+                  <a14:hiddenLine xmlns="" xmlns:a14="http://schemas.microsoft.com/office/drawing/2010/main" w="9525">
                     <a:solidFill>
                       <a:srgbClr val="000000"/>
                     </a:solidFill>
@@ -10992,7 +10995,7 @@
               </a:ln>
               <a:extLst>
                 <a:ext uri="{91240B29-F687-4f45-9708-019B960494DF}">
-                  <a14:hiddenLine xmlns:a14="http://schemas.microsoft.com/office/drawing/2010/main" xmlns="" w="9525">
+                  <a14:hiddenLine xmlns="" xmlns:a14="http://schemas.microsoft.com/office/drawing/2010/main" w="9525">
                     <a:solidFill>
                       <a:srgbClr val="000000"/>
                     </a:solidFill>
@@ -11090,7 +11093,7 @@
               </a:ln>
               <a:extLst>
                 <a:ext uri="{91240B29-F687-4f45-9708-019B960494DF}">
-                  <a14:hiddenLine xmlns:a14="http://schemas.microsoft.com/office/drawing/2010/main" xmlns="" w="9525">
+                  <a14:hiddenLine xmlns="" xmlns:a14="http://schemas.microsoft.com/office/drawing/2010/main" w="9525">
                     <a:solidFill>
                       <a:srgbClr val="000000"/>
                     </a:solidFill>
@@ -11205,7 +11208,7 @@
               </a:ln>
               <a:extLst>
                 <a:ext uri="{91240B29-F687-4f45-9708-019B960494DF}">
-                  <a14:hiddenLine xmlns:a14="http://schemas.microsoft.com/office/drawing/2010/main" xmlns="" w="9525">
+                  <a14:hiddenLine xmlns="" xmlns:a14="http://schemas.microsoft.com/office/drawing/2010/main" w="9525">
                     <a:solidFill>
                       <a:srgbClr val="000000"/>
                     </a:solidFill>
@@ -11295,7 +11298,7 @@
               </a:ln>
               <a:extLst>
                 <a:ext uri="{91240B29-F687-4f45-9708-019B960494DF}">
-                  <a14:hiddenLine xmlns:a14="http://schemas.microsoft.com/office/drawing/2010/main" xmlns="" w="9525">
+                  <a14:hiddenLine xmlns="" xmlns:a14="http://schemas.microsoft.com/office/drawing/2010/main" w="9525">
                     <a:solidFill>
                       <a:srgbClr val="000000"/>
                     </a:solidFill>
@@ -11360,7 +11363,7 @@
               </a:ln>
               <a:extLst>
                 <a:ext uri="{91240B29-F687-4f45-9708-019B960494DF}">
-                  <a14:hiddenLine xmlns:a14="http://schemas.microsoft.com/office/drawing/2010/main" xmlns="" w="9525">
+                  <a14:hiddenLine xmlns="" xmlns:a14="http://schemas.microsoft.com/office/drawing/2010/main" w="9525">
                     <a:solidFill>
                       <a:srgbClr val="000000"/>
                     </a:solidFill>
@@ -11450,7 +11453,7 @@
               </a:ln>
               <a:extLst>
                 <a:ext uri="{91240B29-F687-4f45-9708-019B960494DF}">
-                  <a14:hiddenLine xmlns:a14="http://schemas.microsoft.com/office/drawing/2010/main" xmlns="" w="9525">
+                  <a14:hiddenLine xmlns="" xmlns:a14="http://schemas.microsoft.com/office/drawing/2010/main" w="9525">
                     <a:solidFill>
                       <a:srgbClr val="000000"/>
                     </a:solidFill>
@@ -11518,7 +11521,7 @@
               </a:ln>
               <a:extLst>
                 <a:ext uri="{91240B29-F687-4f45-9708-019B960494DF}">
-                  <a14:hiddenLine xmlns:a14="http://schemas.microsoft.com/office/drawing/2010/main" xmlns="" w="9525">
+                  <a14:hiddenLine xmlns="" xmlns:a14="http://schemas.microsoft.com/office/drawing/2010/main" w="9525">
                     <a:solidFill>
                       <a:srgbClr val="000000"/>
                     </a:solidFill>
@@ -11608,7 +11611,7 @@
               </a:ln>
               <a:extLst>
                 <a:ext uri="{91240B29-F687-4f45-9708-019B960494DF}">
-                  <a14:hiddenLine xmlns:a14="http://schemas.microsoft.com/office/drawing/2010/main" xmlns="" w="9525">
+                  <a14:hiddenLine xmlns="" xmlns:a14="http://schemas.microsoft.com/office/drawing/2010/main" w="9525">
                     <a:solidFill>
                       <a:srgbClr val="000000"/>
                     </a:solidFill>
@@ -11676,7 +11679,7 @@
               </a:ln>
               <a:extLst>
                 <a:ext uri="{91240B29-F687-4f45-9708-019B960494DF}">
-                  <a14:hiddenLine xmlns:a14="http://schemas.microsoft.com/office/drawing/2010/main" xmlns="" w="9525">
+                  <a14:hiddenLine xmlns="" xmlns:a14="http://schemas.microsoft.com/office/drawing/2010/main" w="9525">
                     <a:solidFill>
                       <a:srgbClr val="000000"/>
                     </a:solidFill>
@@ -11766,7 +11769,7 @@
               </a:ln>
               <a:extLst>
                 <a:ext uri="{91240B29-F687-4f45-9708-019B960494DF}">
-                  <a14:hiddenLine xmlns:a14="http://schemas.microsoft.com/office/drawing/2010/main" xmlns="" w="9525">
+                  <a14:hiddenLine xmlns="" xmlns:a14="http://schemas.microsoft.com/office/drawing/2010/main" w="9525">
                     <a:solidFill>
                       <a:srgbClr val="000000"/>
                     </a:solidFill>
@@ -11800,7 +11803,7 @@
               </a:ln>
               <a:extLst>
                 <a:ext uri="{91240B29-F687-4f45-9708-019B960494DF}">
-                  <a14:hiddenLine xmlns:a14="http://schemas.microsoft.com/office/drawing/2010/main" xmlns="" w="9525">
+                  <a14:hiddenLine xmlns="" xmlns:a14="http://schemas.microsoft.com/office/drawing/2010/main" w="9525">
                     <a:solidFill>
                       <a:srgbClr val="000000"/>
                     </a:solidFill>
@@ -12606,8 +12609,21 @@
                   <a:schemeClr val="tx1"/>
                 </a:solidFill>
               </a:rPr>
-              <a:t>Problems with large programs and solution</a:t>
-            </a:r>
+              <a:t>Problems with large programs </a:t>
+            </a:r>
+            <a:r>
+              <a:rPr lang="en-US" cap="none">
+                <a:solidFill>
+                  <a:schemeClr val="tx1"/>
+                </a:solidFill>
+              </a:rPr>
+              <a:t>and the solution</a:t>
+            </a:r>
+            <a:endParaRPr lang="en-US" cap="none" dirty="0">
+              <a:solidFill>
+                <a:schemeClr val="tx1"/>
+              </a:solidFill>
+            </a:endParaRPr>
           </a:p>
         </p:txBody>
       </p:sp>
@@ -12643,10 +12659,186 @@
       </p:grpSpPr>
       <p:sp>
         <p:nvSpPr>
-          <p:cNvPr id="2" name="Title 1">
+          <p:cNvPr id="3" name="Content Placeholder 2">
             <a:extLst>
               <a:ext uri="{FF2B5EF4-FFF2-40B4-BE49-F238E27FC236}">
-                <a16:creationId xmlns:a16="http://schemas.microsoft.com/office/drawing/2014/main" id="{D3DD113A-D08D-47DF-A2B7-107369873155}"/>
+                <a16:creationId xmlns:a16="http://schemas.microsoft.com/office/drawing/2014/main" id="{5628BDDE-76AD-4EA1-B6ED-12752602D66B}"/>
+              </a:ext>
+            </a:extLst>
+          </p:cNvPr>
+          <p:cNvSpPr>
+            <a:spLocks noGrp="1"/>
+          </p:cNvSpPr>
+          <p:nvPr>
+            <p:ph idx="1"/>
+          </p:nvPr>
+        </p:nvSpPr>
+        <p:spPr>
+          <a:xfrm>
+            <a:off x="1143001" y="1026363"/>
+            <a:ext cx="9905999" cy="5670999"/>
+          </a:xfrm>
+        </p:spPr>
+        <p:txBody>
+          <a:bodyPr>
+            <a:normAutofit/>
+          </a:bodyPr>
+          <a:lstStyle/>
+          <a:p>
+            <a:pPr marL="0" indent="0" algn="ctr">
+              <a:buNone/>
+            </a:pPr>
+            <a:r>
+              <a:rPr lang="en-US" u="sng" dirty="0"/>
+              <a:t>Defining a Control Structure for Omron SYSMAC</a:t>
+            </a:r>
+          </a:p>
+          <a:p>
+            <a:pPr lvl="2"/>
+            <a:r>
+              <a:rPr lang="en-US" dirty="0"/>
+              <a:t>bit</a:t>
+            </a:r>
+          </a:p>
+        </p:txBody>
+      </p:sp>
+      <p:pic>
+        <p:nvPicPr>
+          <p:cNvPr id="5" name="Picture 4">
+            <a:extLst>
+              <a:ext uri="{FF2B5EF4-FFF2-40B4-BE49-F238E27FC236}">
+                <a16:creationId xmlns:a16="http://schemas.microsoft.com/office/drawing/2014/main" id="{17EA7108-F19F-491D-8595-58F95C0D7373}"/>
+              </a:ext>
+            </a:extLst>
+          </p:cNvPr>
+          <p:cNvPicPr>
+            <a:picLocks noChangeAspect="1"/>
+          </p:cNvPicPr>
+          <p:nvPr/>
+        </p:nvPicPr>
+        <p:blipFill>
+          <a:blip r:embed="rId2"/>
+          <a:stretch>
+            <a:fillRect/>
+          </a:stretch>
+        </p:blipFill>
+        <p:spPr>
+          <a:xfrm>
+            <a:off x="795079" y="1668138"/>
+            <a:ext cx="5284804" cy="3119016"/>
+          </a:xfrm>
+          <a:prstGeom prst="rect">
+            <a:avLst/>
+          </a:prstGeom>
+        </p:spPr>
+      </p:pic>
+      <p:sp>
+        <p:nvSpPr>
+          <p:cNvPr id="6" name="TextBox 5">
+            <a:extLst>
+              <a:ext uri="{FF2B5EF4-FFF2-40B4-BE49-F238E27FC236}">
+                <a16:creationId xmlns:a16="http://schemas.microsoft.com/office/drawing/2014/main" id="{AA00E37E-B632-4FCE-AA4F-DAC47FA7A3BF}"/>
+              </a:ext>
+            </a:extLst>
+          </p:cNvPr>
+          <p:cNvSpPr txBox="1"/>
+          <p:nvPr/>
+        </p:nvSpPr>
+        <p:spPr>
+          <a:xfrm>
+            <a:off x="6257141" y="1668138"/>
+            <a:ext cx="5139780" cy="2862322"/>
+          </a:xfrm>
+          <a:prstGeom prst="rect">
+            <a:avLst/>
+          </a:prstGeom>
+          <a:noFill/>
+        </p:spPr>
+        <p:txBody>
+          <a:bodyPr wrap="square" rtlCol="0">
+            <a:spAutoFit/>
+          </a:bodyPr>
+          <a:lstStyle/>
+          <a:p>
+            <a:pPr marL="285750" indent="-285750">
+              <a:buFont typeface="Arial" panose="020B0604020202020204" pitchFamily="34" charset="0"/>
+              <a:buChar char="•"/>
+            </a:pPr>
+            <a:r>
+              <a:rPr lang="en-US" dirty="0"/>
+              <a:t>In the SYSMAC environment</a:t>
+            </a:r>
+          </a:p>
+          <a:p>
+            <a:pPr marL="742950" lvl="1" indent="-285750">
+              <a:buFont typeface="Arial" panose="020B0604020202020204" pitchFamily="34" charset="0"/>
+              <a:buChar char="•"/>
+            </a:pPr>
+            <a:r>
+              <a:rPr lang="en-US" dirty="0" err="1"/>
+              <a:t>Y_Slide_Up.b</a:t>
+            </a:r>
+            <a:r>
+              <a:rPr lang="en-US" dirty="0"/>
+              <a:t>(2) Rung enables a Timer On function block defined by time variable T#300ms.</a:t>
+            </a:r>
+          </a:p>
+          <a:p>
+            <a:pPr marL="742950" lvl="1" indent="-285750">
+              <a:buFont typeface="Arial" panose="020B0604020202020204" pitchFamily="34" charset="0"/>
+              <a:buChar char="•"/>
+            </a:pPr>
+            <a:r>
+              <a:rPr lang="en-US" dirty="0"/>
+              <a:t>Once the timer complete </a:t>
+            </a:r>
+            <a:r>
+              <a:rPr lang="en-US" dirty="0" err="1"/>
+              <a:t>Y_Slide_Up.b</a:t>
+            </a:r>
+            <a:r>
+              <a:rPr lang="en-US" dirty="0"/>
+              <a:t>(2) is reset and </a:t>
+            </a:r>
+            <a:r>
+              <a:rPr lang="en-US" dirty="0" err="1"/>
+              <a:t>Y_Slide_Up.b</a:t>
+            </a:r>
+            <a:r>
+              <a:rPr lang="en-US" dirty="0"/>
+              <a:t>(15) is set.</a:t>
+            </a:r>
+          </a:p>
+          <a:p>
+            <a:pPr marL="742950" lvl="1" indent="-285750">
+              <a:buFont typeface="Arial" panose="020B0604020202020204" pitchFamily="34" charset="0"/>
+              <a:buChar char="•"/>
+            </a:pPr>
+            <a:r>
+              <a:rPr lang="en-US" dirty="0" err="1"/>
+              <a:t>Y_Slide_Up.b</a:t>
+            </a:r>
+            <a:r>
+              <a:rPr lang="en-US" dirty="0"/>
+              <a:t>(15)  is the stop flag which activate the MOVE function that copy 0 to WORD portion that resets all of the bit in the </a:t>
+            </a:r>
+            <a:r>
+              <a:rPr lang="en-US" dirty="0" err="1"/>
+              <a:t>CntrlSeq</a:t>
+            </a:r>
+            <a:r>
+              <a:rPr lang="en-US" dirty="0"/>
+              <a:t> variable.</a:t>
+            </a:r>
+          </a:p>
+        </p:txBody>
+      </p:sp>
+      <p:sp>
+        <p:nvSpPr>
+          <p:cNvPr id="9" name="Title 1">
+            <a:extLst>
+              <a:ext uri="{FF2B5EF4-FFF2-40B4-BE49-F238E27FC236}">
+                <a16:creationId xmlns:a16="http://schemas.microsoft.com/office/drawing/2014/main" id="{4C903F7B-1678-4D44-9CED-C8244A5D772F}"/>
               </a:ext>
             </a:extLst>
           </p:cNvPr>
@@ -12659,24 +12851,51 @@
         </p:nvSpPr>
         <p:spPr>
           <a:xfrm>
-            <a:off x="1249891" y="277091"/>
-            <a:ext cx="9905998" cy="720870"/>
+            <a:off x="1143001" y="160638"/>
+            <a:ext cx="9905998" cy="865725"/>
           </a:xfrm>
         </p:spPr>
         <p:txBody>
-          <a:bodyPr>
-            <a:normAutofit/>
-          </a:bodyPr>
+          <a:bodyPr/>
           <a:lstStyle/>
           <a:p>
-            <a:pPr algn="ctr"/>
             <a:r>
               <a:rPr lang="en-US" dirty="0"/>
-              <a:t>Intro to PLC Programming</a:t>
+              <a:t>PLC Programming</a:t>
             </a:r>
           </a:p>
         </p:txBody>
       </p:sp>
+    </p:spTree>
+    <p:extLst>
+      <p:ext uri="{BB962C8B-B14F-4D97-AF65-F5344CB8AC3E}">
+        <p14:creationId xmlns:p14="http://schemas.microsoft.com/office/powerpoint/2010/main" val="2540941222"/>
+      </p:ext>
+    </p:extLst>
+  </p:cSld>
+  <p:clrMapOvr>
+    <a:masterClrMapping/>
+  </p:clrMapOvr>
+</p:sld>
+</file>
+
+<file path=ppt/slides/slide11.xml><?xml version="1.0" encoding="utf-8"?>
+<p:sld xmlns:a="http://schemas.openxmlformats.org/drawingml/2006/main" xmlns:r="http://schemas.openxmlformats.org/officeDocument/2006/relationships" xmlns:p="http://schemas.openxmlformats.org/presentationml/2006/main">
+  <p:cSld>
+    <p:spTree>
+      <p:nvGrpSpPr>
+        <p:cNvPr id="1" name=""/>
+        <p:cNvGrpSpPr/>
+        <p:nvPr/>
+      </p:nvGrpSpPr>
+      <p:grpSpPr>
+        <a:xfrm>
+          <a:off x="0" y="0"/>
+          <a:ext cx="0" cy="0"/>
+          <a:chOff x="0" y="0"/>
+          <a:chExt cx="0" cy="0"/>
+        </a:xfrm>
+      </p:grpSpPr>
       <p:sp>
         <p:nvSpPr>
           <p:cNvPr id="3" name="Content Placeholder 2">
@@ -12695,13 +12914,13 @@
         </p:nvSpPr>
         <p:spPr>
           <a:xfrm>
-            <a:off x="1427149" y="997961"/>
-            <a:ext cx="8379872" cy="438210"/>
+            <a:off x="2598759" y="997961"/>
+            <a:ext cx="7567217" cy="438210"/>
           </a:xfrm>
         </p:spPr>
         <p:txBody>
           <a:bodyPr anchor="ctr">
-            <a:normAutofit fontScale="92500" lnSpcReduction="20000"/>
+            <a:noAutofit/>
           </a:bodyPr>
           <a:lstStyle/>
           <a:p>
@@ -12710,7 +12929,327 @@
             </a:pPr>
             <a:r>
               <a:rPr lang="en-US" u="sng" dirty="0"/>
-              <a:t>Defining a Block of code for </a:t>
+              <a:t>Defining a Control Structure for </a:t>
+            </a:r>
+            <a:r>
+              <a:rPr lang="en-US" u="sng" dirty="0" err="1"/>
+              <a:t>Kollmorgen</a:t>
+            </a:r>
+            <a:r>
+              <a:rPr lang="en-US" u="sng" dirty="0"/>
+              <a:t> Automation Suite</a:t>
+            </a:r>
+          </a:p>
+        </p:txBody>
+      </p:sp>
+      <p:pic>
+        <p:nvPicPr>
+          <p:cNvPr id="7" name="Picture 6" descr="Diagram&#10;&#10;Description automatically generated">
+            <a:extLst>
+              <a:ext uri="{FF2B5EF4-FFF2-40B4-BE49-F238E27FC236}">
+                <a16:creationId xmlns:a16="http://schemas.microsoft.com/office/drawing/2014/main" id="{48E1FF95-C875-40B7-B73E-FF2DF855BFDA}"/>
+              </a:ext>
+            </a:extLst>
+          </p:cNvPr>
+          <p:cNvPicPr>
+            <a:picLocks noChangeAspect="1"/>
+          </p:cNvPicPr>
+          <p:nvPr/>
+        </p:nvPicPr>
+        <p:blipFill>
+          <a:blip r:embed="rId2"/>
+          <a:stretch>
+            <a:fillRect/>
+          </a:stretch>
+        </p:blipFill>
+        <p:spPr>
+          <a:xfrm>
+            <a:off x="873281" y="1718830"/>
+            <a:ext cx="5297001" cy="3056369"/>
+          </a:xfrm>
+          <a:prstGeom prst="rect">
+            <a:avLst/>
+          </a:prstGeom>
+        </p:spPr>
+      </p:pic>
+      <p:sp>
+        <p:nvSpPr>
+          <p:cNvPr id="8" name="TextBox 7">
+            <a:extLst>
+              <a:ext uri="{FF2B5EF4-FFF2-40B4-BE49-F238E27FC236}">
+                <a16:creationId xmlns:a16="http://schemas.microsoft.com/office/drawing/2014/main" id="{5A58CF2E-14AA-479D-A910-F46C32BF89A5}"/>
+              </a:ext>
+            </a:extLst>
+          </p:cNvPr>
+          <p:cNvSpPr txBox="1"/>
+          <p:nvPr/>
+        </p:nvSpPr>
+        <p:spPr>
+          <a:xfrm>
+            <a:off x="6446982" y="1732190"/>
+            <a:ext cx="4461163" cy="4801314"/>
+          </a:xfrm>
+          <a:prstGeom prst="rect">
+            <a:avLst/>
+          </a:prstGeom>
+          <a:noFill/>
+        </p:spPr>
+        <p:txBody>
+          <a:bodyPr wrap="square" rtlCol="0">
+            <a:spAutoFit/>
+          </a:bodyPr>
+          <a:lstStyle/>
+          <a:p>
+            <a:pPr marL="285750" indent="-285750">
+              <a:buFont typeface="Arial" panose="020B0604020202020204" pitchFamily="34" charset="0"/>
+              <a:buChar char="•"/>
+            </a:pPr>
+            <a:r>
+              <a:rPr lang="en-US" dirty="0" err="1"/>
+              <a:t>LeftFoilOn</a:t>
+            </a:r>
+            <a:r>
+              <a:rPr lang="en-US" dirty="0"/>
+              <a:t>[x] is an array of 16 bool</a:t>
+            </a:r>
+          </a:p>
+          <a:p>
+            <a:pPr marL="285750" indent="-285750">
+              <a:buFont typeface="Arial" panose="020B0604020202020204" pitchFamily="34" charset="0"/>
+              <a:buChar char="•"/>
+            </a:pPr>
+            <a:r>
+              <a:rPr lang="en-US" dirty="0" err="1"/>
+              <a:t>LeftFoilOn</a:t>
+            </a:r>
+            <a:r>
+              <a:rPr lang="en-US" dirty="0"/>
+              <a:t>[0] is the Enabling bit</a:t>
+            </a:r>
+          </a:p>
+          <a:p>
+            <a:pPr marL="285750" indent="-285750">
+              <a:buFont typeface="Arial" panose="020B0604020202020204" pitchFamily="34" charset="0"/>
+              <a:buChar char="•"/>
+            </a:pPr>
+            <a:r>
+              <a:rPr lang="en-US" dirty="0"/>
+              <a:t>If </a:t>
+            </a:r>
+            <a:r>
+              <a:rPr lang="en-US" dirty="0" err="1"/>
+              <a:t>LeftFoilOn</a:t>
+            </a:r>
+            <a:r>
+              <a:rPr lang="en-US" dirty="0"/>
+              <a:t>[0] is Off the </a:t>
+            </a:r>
+          </a:p>
+          <a:p>
+            <a:pPr marL="742950" lvl="1" indent="-285750">
+              <a:buFont typeface="Arial" panose="020B0604020202020204" pitchFamily="34" charset="0"/>
+              <a:buChar char="•"/>
+            </a:pPr>
+            <a:r>
+              <a:rPr lang="en-US" dirty="0"/>
+              <a:t>--&gt;&gt; </a:t>
+            </a:r>
+            <a:r>
+              <a:rPr lang="en-US" dirty="0" err="1"/>
+              <a:t>LeftFoilAitOn_End</a:t>
+            </a:r>
+            <a:r>
+              <a:rPr lang="en-US" dirty="0"/>
+              <a:t> is the Jump Statement that bypasses this Network of code.</a:t>
+            </a:r>
+          </a:p>
+          <a:p>
+            <a:pPr marL="742950" lvl="1" indent="-285750">
+              <a:buFont typeface="Arial" panose="020B0604020202020204" pitchFamily="34" charset="0"/>
+              <a:buChar char="•"/>
+            </a:pPr>
+            <a:r>
+              <a:rPr lang="en-US" dirty="0"/>
+              <a:t>On Network #2: </a:t>
+            </a:r>
+            <a:r>
+              <a:rPr lang="en-US" dirty="0" err="1"/>
+              <a:t>LeftFoilAirOn_End</a:t>
+            </a:r>
+            <a:r>
+              <a:rPr lang="en-US" dirty="0"/>
+              <a:t> is the label that the Jump statement refers to.</a:t>
+            </a:r>
+          </a:p>
+          <a:p>
+            <a:pPr marL="285750" indent="-285750">
+              <a:buFont typeface="Arial" panose="020B0604020202020204" pitchFamily="34" charset="0"/>
+              <a:buChar char="•"/>
+            </a:pPr>
+            <a:r>
+              <a:rPr lang="en-US" dirty="0"/>
+              <a:t>The </a:t>
+            </a:r>
+            <a:r>
+              <a:rPr lang="en-US" u="sng" dirty="0"/>
+              <a:t>Reset16BitArray</a:t>
+            </a:r>
+            <a:r>
+              <a:rPr lang="en-US" dirty="0"/>
+              <a:t> function block is used to reset the individual bits in the array</a:t>
+            </a:r>
+          </a:p>
+          <a:p>
+            <a:pPr marL="285750" indent="-285750">
+              <a:buFont typeface="Arial" panose="020B0604020202020204" pitchFamily="34" charset="0"/>
+              <a:buChar char="•"/>
+            </a:pPr>
+            <a:r>
+              <a:rPr lang="en-US" dirty="0" err="1"/>
+              <a:t>LeftFoilOn</a:t>
+            </a:r>
+            <a:r>
+              <a:rPr lang="en-US" dirty="0"/>
+              <a:t>[1] is the starting bit for the block of code</a:t>
+            </a:r>
+          </a:p>
+          <a:p>
+            <a:pPr marL="285750" indent="-285750">
+              <a:buFont typeface="Arial" panose="020B0604020202020204" pitchFamily="34" charset="0"/>
+              <a:buChar char="•"/>
+            </a:pPr>
+            <a:r>
+              <a:rPr lang="en-US" dirty="0" err="1"/>
+              <a:t>LeftFoilOn</a:t>
+            </a:r>
+            <a:r>
+              <a:rPr lang="en-US" dirty="0"/>
+              <a:t>[1] rung sets an output variable “</a:t>
+            </a:r>
+            <a:r>
+              <a:rPr lang="en-US" dirty="0" err="1"/>
+              <a:t>Outputs_LeftFoilPlattenAir</a:t>
+            </a:r>
+            <a:r>
+              <a:rPr lang="en-US" dirty="0"/>
+              <a:t>” then proceed to reset the current rung </a:t>
+            </a:r>
+            <a:r>
+              <a:rPr lang="en-US" dirty="0" err="1"/>
+              <a:t>LeftFoilOn</a:t>
+            </a:r>
+            <a:r>
+              <a:rPr lang="en-US" dirty="0"/>
+              <a:t>[1] then set the next rung </a:t>
+            </a:r>
+            <a:r>
+              <a:rPr lang="en-US" dirty="0" err="1"/>
+              <a:t>LeftFoilOn</a:t>
+            </a:r>
+            <a:r>
+              <a:rPr lang="en-US" dirty="0"/>
+              <a:t>[2].</a:t>
+            </a:r>
+          </a:p>
+        </p:txBody>
+      </p:sp>
+      <p:sp>
+        <p:nvSpPr>
+          <p:cNvPr id="9" name="Title 1">
+            <a:extLst>
+              <a:ext uri="{FF2B5EF4-FFF2-40B4-BE49-F238E27FC236}">
+                <a16:creationId xmlns:a16="http://schemas.microsoft.com/office/drawing/2014/main" id="{418C5C7D-5D52-4CBA-830F-CBE1B26711ED}"/>
+              </a:ext>
+            </a:extLst>
+          </p:cNvPr>
+          <p:cNvSpPr>
+            <a:spLocks noGrp="1"/>
+          </p:cNvSpPr>
+          <p:nvPr>
+            <p:ph type="title"/>
+          </p:nvPr>
+        </p:nvSpPr>
+        <p:spPr>
+          <a:xfrm>
+            <a:off x="1143001" y="160638"/>
+            <a:ext cx="9905998" cy="865725"/>
+          </a:xfrm>
+        </p:spPr>
+        <p:txBody>
+          <a:bodyPr/>
+          <a:lstStyle/>
+          <a:p>
+            <a:r>
+              <a:rPr lang="en-US" dirty="0"/>
+              <a:t>PLC Programming</a:t>
+            </a:r>
+          </a:p>
+        </p:txBody>
+      </p:sp>
+    </p:spTree>
+    <p:extLst>
+      <p:ext uri="{BB962C8B-B14F-4D97-AF65-F5344CB8AC3E}">
+        <p14:creationId xmlns:p14="http://schemas.microsoft.com/office/powerpoint/2010/main" val="3369755779"/>
+      </p:ext>
+    </p:extLst>
+  </p:cSld>
+  <p:clrMapOvr>
+    <a:masterClrMapping/>
+  </p:clrMapOvr>
+</p:sld>
+</file>
+
+<file path=ppt/slides/slide12.xml><?xml version="1.0" encoding="utf-8"?>
+<p:sld xmlns:a="http://schemas.openxmlformats.org/drawingml/2006/main" xmlns:r="http://schemas.openxmlformats.org/officeDocument/2006/relationships" xmlns:p="http://schemas.openxmlformats.org/presentationml/2006/main">
+  <p:cSld>
+    <p:spTree>
+      <p:nvGrpSpPr>
+        <p:cNvPr id="1" name=""/>
+        <p:cNvGrpSpPr/>
+        <p:nvPr/>
+      </p:nvGrpSpPr>
+      <p:grpSpPr>
+        <a:xfrm>
+          <a:off x="0" y="0"/>
+          <a:ext cx="0" cy="0"/>
+          <a:chOff x="0" y="0"/>
+          <a:chExt cx="0" cy="0"/>
+        </a:xfrm>
+      </p:grpSpPr>
+      <p:sp>
+        <p:nvSpPr>
+          <p:cNvPr id="3" name="Content Placeholder 2">
+            <a:extLst>
+              <a:ext uri="{FF2B5EF4-FFF2-40B4-BE49-F238E27FC236}">
+                <a16:creationId xmlns:a16="http://schemas.microsoft.com/office/drawing/2014/main" id="{5628BDDE-76AD-4EA1-B6ED-12752602D66B}"/>
+              </a:ext>
+            </a:extLst>
+          </p:cNvPr>
+          <p:cNvSpPr>
+            <a:spLocks noGrp="1"/>
+          </p:cNvSpPr>
+          <p:nvPr>
+            <p:ph idx="1"/>
+          </p:nvPr>
+        </p:nvSpPr>
+        <p:spPr>
+          <a:xfrm>
+            <a:off x="1427148" y="997961"/>
+            <a:ext cx="9088451" cy="438210"/>
+          </a:xfrm>
+        </p:spPr>
+        <p:txBody>
+          <a:bodyPr anchor="ctr">
+            <a:noAutofit/>
+          </a:bodyPr>
+          <a:lstStyle/>
+          <a:p>
+            <a:pPr marL="0" indent="0">
+              <a:buNone/>
+            </a:pPr>
+            <a:r>
+              <a:rPr lang="en-US" u="sng" dirty="0"/>
+              <a:t>Defining a Control Structure for </a:t>
             </a:r>
             <a:r>
               <a:rPr lang="en-US" u="sng" dirty="0" err="1"/>
@@ -12791,15 +13330,7 @@
             </a:r>
             <a:r>
               <a:rPr lang="en-US" dirty="0"/>
-              <a:t>[2] Rung enables a Timer On function </a:t>
-            </a:r>
-            <a:r>
-              <a:rPr lang="en-US"/>
-              <a:t>block defined </a:t>
-            </a:r>
-            <a:r>
-              <a:rPr lang="en-US" dirty="0"/>
-              <a:t>by literal time variable time#10ms.</a:t>
+              <a:t>[2] Rung enables a Timer On function block defined by literal time variable time#10ms.</a:t>
             </a:r>
           </a:p>
           <a:p>
@@ -12892,10 +13423,313 @@
           </a:p>
         </p:txBody>
       </p:sp>
+      <p:sp>
+        <p:nvSpPr>
+          <p:cNvPr id="9" name="Title 1">
+            <a:extLst>
+              <a:ext uri="{FF2B5EF4-FFF2-40B4-BE49-F238E27FC236}">
+                <a16:creationId xmlns:a16="http://schemas.microsoft.com/office/drawing/2014/main" id="{A7EDB3A1-72D0-4B4F-80B6-77CDA77615EB}"/>
+              </a:ext>
+            </a:extLst>
+          </p:cNvPr>
+          <p:cNvSpPr>
+            <a:spLocks noGrp="1"/>
+          </p:cNvSpPr>
+          <p:nvPr>
+            <p:ph type="title"/>
+          </p:nvPr>
+        </p:nvSpPr>
+        <p:spPr>
+          <a:xfrm>
+            <a:off x="1143001" y="160638"/>
+            <a:ext cx="9905998" cy="865725"/>
+          </a:xfrm>
+        </p:spPr>
+        <p:txBody>
+          <a:bodyPr/>
+          <a:lstStyle/>
+          <a:p>
+            <a:r>
+              <a:rPr lang="en-US" dirty="0"/>
+              <a:t>PLC Programming</a:t>
+            </a:r>
+          </a:p>
+        </p:txBody>
+      </p:sp>
     </p:spTree>
     <p:extLst>
       <p:ext uri="{BB962C8B-B14F-4D97-AF65-F5344CB8AC3E}">
         <p14:creationId xmlns:p14="http://schemas.microsoft.com/office/powerpoint/2010/main" val="2726098533"/>
+      </p:ext>
+    </p:extLst>
+  </p:cSld>
+  <p:clrMapOvr>
+    <a:masterClrMapping/>
+  </p:clrMapOvr>
+</p:sld>
+</file>
+
+<file path=ppt/slides/slide13.xml><?xml version="1.0" encoding="utf-8"?>
+<p:sld xmlns:a="http://schemas.openxmlformats.org/drawingml/2006/main" xmlns:r="http://schemas.openxmlformats.org/officeDocument/2006/relationships" xmlns:p="http://schemas.openxmlformats.org/presentationml/2006/main">
+  <p:cSld>
+    <p:spTree>
+      <p:nvGrpSpPr>
+        <p:cNvPr id="1" name=""/>
+        <p:cNvGrpSpPr/>
+        <p:nvPr/>
+      </p:nvGrpSpPr>
+      <p:grpSpPr>
+        <a:xfrm>
+          <a:off x="0" y="0"/>
+          <a:ext cx="0" cy="0"/>
+          <a:chOff x="0" y="0"/>
+          <a:chExt cx="0" cy="0"/>
+        </a:xfrm>
+      </p:grpSpPr>
+      <p:sp>
+        <p:nvSpPr>
+          <p:cNvPr id="3" name="Content Placeholder 2">
+            <a:extLst>
+              <a:ext uri="{FF2B5EF4-FFF2-40B4-BE49-F238E27FC236}">
+                <a16:creationId xmlns:a16="http://schemas.microsoft.com/office/drawing/2014/main" id="{5628BDDE-76AD-4EA1-B6ED-12752602D66B}"/>
+              </a:ext>
+            </a:extLst>
+          </p:cNvPr>
+          <p:cNvSpPr>
+            <a:spLocks noGrp="1"/>
+          </p:cNvSpPr>
+          <p:nvPr>
+            <p:ph idx="1"/>
+          </p:nvPr>
+        </p:nvSpPr>
+        <p:spPr>
+          <a:xfrm>
+            <a:off x="1427148" y="997961"/>
+            <a:ext cx="9088451" cy="438210"/>
+          </a:xfrm>
+        </p:spPr>
+        <p:txBody>
+          <a:bodyPr anchor="ctr">
+            <a:noAutofit/>
+          </a:bodyPr>
+          <a:lstStyle/>
+          <a:p>
+            <a:pPr marL="0" indent="0">
+              <a:buNone/>
+            </a:pPr>
+            <a:r>
+              <a:rPr lang="en-US" u="sng" dirty="0"/>
+              <a:t>Defining a Control Structure for </a:t>
+            </a:r>
+            <a:r>
+              <a:rPr lang="en-US" u="sng" dirty="0" err="1"/>
+              <a:t>Kollmorgen</a:t>
+            </a:r>
+            <a:r>
+              <a:rPr lang="en-US" u="sng" dirty="0"/>
+              <a:t> Automation Suite : Continued </a:t>
+            </a:r>
+          </a:p>
+        </p:txBody>
+      </p:sp>
+      <p:pic>
+        <p:nvPicPr>
+          <p:cNvPr id="7" name="Picture 6" descr="Diagram&#10;&#10;Description automatically generated">
+            <a:extLst>
+              <a:ext uri="{FF2B5EF4-FFF2-40B4-BE49-F238E27FC236}">
+                <a16:creationId xmlns:a16="http://schemas.microsoft.com/office/drawing/2014/main" id="{48E1FF95-C875-40B7-B73E-FF2DF855BFDA}"/>
+              </a:ext>
+            </a:extLst>
+          </p:cNvPr>
+          <p:cNvPicPr>
+            <a:picLocks noChangeAspect="1"/>
+          </p:cNvPicPr>
+          <p:nvPr/>
+        </p:nvPicPr>
+        <p:blipFill>
+          <a:blip r:embed="rId2"/>
+          <a:stretch>
+            <a:fillRect/>
+          </a:stretch>
+        </p:blipFill>
+        <p:spPr>
+          <a:xfrm>
+            <a:off x="873281" y="1718830"/>
+            <a:ext cx="5297001" cy="3056369"/>
+          </a:xfrm>
+          <a:prstGeom prst="rect">
+            <a:avLst/>
+          </a:prstGeom>
+        </p:spPr>
+      </p:pic>
+      <p:sp>
+        <p:nvSpPr>
+          <p:cNvPr id="8" name="TextBox 7">
+            <a:extLst>
+              <a:ext uri="{FF2B5EF4-FFF2-40B4-BE49-F238E27FC236}">
+                <a16:creationId xmlns:a16="http://schemas.microsoft.com/office/drawing/2014/main" id="{5A58CF2E-14AA-479D-A910-F46C32BF89A5}"/>
+              </a:ext>
+            </a:extLst>
+          </p:cNvPr>
+          <p:cNvSpPr txBox="1"/>
+          <p:nvPr/>
+        </p:nvSpPr>
+        <p:spPr>
+          <a:xfrm>
+            <a:off x="6446982" y="1732190"/>
+            <a:ext cx="4577093" cy="2862322"/>
+          </a:xfrm>
+          <a:prstGeom prst="rect">
+            <a:avLst/>
+          </a:prstGeom>
+          <a:noFill/>
+        </p:spPr>
+        <p:txBody>
+          <a:bodyPr wrap="square" rtlCol="0">
+            <a:spAutoFit/>
+          </a:bodyPr>
+          <a:lstStyle/>
+          <a:p>
+            <a:pPr marL="285750" indent="-285750">
+              <a:buFont typeface="Arial" panose="020B0604020202020204" pitchFamily="34" charset="0"/>
+              <a:buChar char="•"/>
+            </a:pPr>
+            <a:r>
+              <a:rPr lang="en-US" dirty="0" err="1"/>
+              <a:t>LeftFoilAirOn</a:t>
+            </a:r>
+            <a:r>
+              <a:rPr lang="en-US" dirty="0"/>
+              <a:t>[2] Rung enables a Timer On function block defined by literal time variable time#10ms.</a:t>
+            </a:r>
+          </a:p>
+          <a:p>
+            <a:pPr marL="285750" indent="-285750">
+              <a:buFont typeface="Arial" panose="020B0604020202020204" pitchFamily="34" charset="0"/>
+              <a:buChar char="•"/>
+            </a:pPr>
+            <a:r>
+              <a:rPr lang="en-US" dirty="0"/>
+              <a:t>After 10ms the </a:t>
+            </a:r>
+            <a:r>
+              <a:rPr lang="en-US" dirty="0" err="1"/>
+              <a:t>LeftFoilAirOn</a:t>
+            </a:r>
+            <a:r>
+              <a:rPr lang="en-US" dirty="0"/>
+              <a:t>[2] rung is Reset and the Last Bit in the array is set to finish the block.</a:t>
+            </a:r>
+          </a:p>
+          <a:p>
+            <a:pPr marL="285750" indent="-285750">
+              <a:buFont typeface="Arial" panose="020B0604020202020204" pitchFamily="34" charset="0"/>
+              <a:buChar char="•"/>
+            </a:pPr>
+            <a:r>
+              <a:rPr lang="en-US" dirty="0" err="1"/>
+              <a:t>LeftFoilAirOn</a:t>
+            </a:r>
+            <a:r>
+              <a:rPr lang="en-US" dirty="0"/>
+              <a:t>[15] activates the </a:t>
+            </a:r>
+            <a:r>
+              <a:rPr lang="en-US" u="sng" dirty="0"/>
+              <a:t>Reset16BitArray </a:t>
+            </a:r>
+            <a:r>
+              <a:rPr lang="en-US" dirty="0"/>
+              <a:t>function block which reset the array of bits in the </a:t>
+            </a:r>
+            <a:r>
+              <a:rPr lang="en-US" dirty="0" err="1"/>
+              <a:t>LeftFoilAirOn</a:t>
+            </a:r>
+            <a:r>
+              <a:rPr lang="en-US" dirty="0"/>
+              <a:t> array thereby turning off the block of code.</a:t>
+            </a:r>
+            <a:endParaRPr lang="en-US" u="sng" dirty="0"/>
+          </a:p>
+        </p:txBody>
+      </p:sp>
+      <p:sp>
+        <p:nvSpPr>
+          <p:cNvPr id="6" name="TextBox 5">
+            <a:extLst>
+              <a:ext uri="{FF2B5EF4-FFF2-40B4-BE49-F238E27FC236}">
+                <a16:creationId xmlns:a16="http://schemas.microsoft.com/office/drawing/2014/main" id="{51561511-08D5-4794-8488-DE4E8475215B}"/>
+              </a:ext>
+            </a:extLst>
+          </p:cNvPr>
+          <p:cNvSpPr txBox="1"/>
+          <p:nvPr/>
+        </p:nvSpPr>
+        <p:spPr>
+          <a:xfrm>
+            <a:off x="6446981" y="4775199"/>
+            <a:ext cx="4577093" cy="923330"/>
+          </a:xfrm>
+          <a:prstGeom prst="rect">
+            <a:avLst/>
+          </a:prstGeom>
+          <a:noFill/>
+        </p:spPr>
+        <p:txBody>
+          <a:bodyPr wrap="square" rtlCol="0">
+            <a:spAutoFit/>
+          </a:bodyPr>
+          <a:lstStyle/>
+          <a:p>
+            <a:pPr marL="285750" indent="-285750">
+              <a:buFont typeface="Arial" panose="020B0604020202020204" pitchFamily="34" charset="0"/>
+              <a:buChar char="•"/>
+            </a:pPr>
+            <a:r>
+              <a:rPr lang="en-US" dirty="0"/>
+              <a:t>This block code represents the basic building block of ladder logic that will be used to write your programs.</a:t>
+            </a:r>
+          </a:p>
+        </p:txBody>
+      </p:sp>
+      <p:sp>
+        <p:nvSpPr>
+          <p:cNvPr id="9" name="Title 1">
+            <a:extLst>
+              <a:ext uri="{FF2B5EF4-FFF2-40B4-BE49-F238E27FC236}">
+                <a16:creationId xmlns:a16="http://schemas.microsoft.com/office/drawing/2014/main" id="{313A0EF3-B494-4D4D-B869-70315748B8F9}"/>
+              </a:ext>
+            </a:extLst>
+          </p:cNvPr>
+          <p:cNvSpPr>
+            <a:spLocks noGrp="1"/>
+          </p:cNvSpPr>
+          <p:nvPr>
+            <p:ph type="title"/>
+          </p:nvPr>
+        </p:nvSpPr>
+        <p:spPr>
+          <a:xfrm>
+            <a:off x="1143001" y="160638"/>
+            <a:ext cx="9905998" cy="865725"/>
+          </a:xfrm>
+        </p:spPr>
+        <p:txBody>
+          <a:bodyPr/>
+          <a:lstStyle/>
+          <a:p>
+            <a:r>
+              <a:rPr lang="en-US" dirty="0"/>
+              <a:t>PLC Programming</a:t>
+            </a:r>
+          </a:p>
+        </p:txBody>
+      </p:sp>
+    </p:spTree>
+    <p:extLst>
+      <p:ext uri="{BB962C8B-B14F-4D97-AF65-F5344CB8AC3E}">
+        <p14:creationId xmlns:p14="http://schemas.microsoft.com/office/powerpoint/2010/main" val="3404865324"/>
       </p:ext>
     </p:extLst>
   </p:cSld>
@@ -13161,12 +13995,12 @@
             </a:r>
           </a:p>
           <a:p>
-            <a:pPr lvl="2"/>
-            <a:r>
-              <a:rPr lang="en-US" sz="1600" dirty="0"/>
+            <a:pPr lvl="3"/>
+            <a:r>
+              <a:rPr lang="en-US" sz="1400" dirty="0"/>
               <a:t>https://press.rebus.community/programmingfundamentals/chapter/structured-programming/</a:t>
             </a:r>
-            <a:endParaRPr lang="en-US" sz="1600" b="0" i="0" dirty="0">
+            <a:endParaRPr lang="en-US" sz="1400" b="0" i="0" dirty="0">
               <a:effectLst/>
             </a:endParaRPr>
           </a:p>
@@ -13526,39 +14360,6 @@
       </p:grpSpPr>
       <p:sp>
         <p:nvSpPr>
-          <p:cNvPr id="2" name="Title 1">
-            <a:extLst>
-              <a:ext uri="{FF2B5EF4-FFF2-40B4-BE49-F238E27FC236}">
-                <a16:creationId xmlns:a16="http://schemas.microsoft.com/office/drawing/2014/main" id="{D3DD113A-D08D-47DF-A2B7-107369873155}"/>
-              </a:ext>
-            </a:extLst>
-          </p:cNvPr>
-          <p:cNvSpPr>
-            <a:spLocks noGrp="1"/>
-          </p:cNvSpPr>
-          <p:nvPr>
-            <p:ph type="title"/>
-          </p:nvPr>
-        </p:nvSpPr>
-        <p:spPr>
-          <a:xfrm>
-            <a:off x="1143001" y="160638"/>
-            <a:ext cx="9905998" cy="865725"/>
-          </a:xfrm>
-        </p:spPr>
-        <p:txBody>
-          <a:bodyPr/>
-          <a:lstStyle/>
-          <a:p>
-            <a:r>
-              <a:rPr lang="en-US" dirty="0"/>
-              <a:t>Intro to PLC Programming</a:t>
-            </a:r>
-          </a:p>
-        </p:txBody>
-      </p:sp>
-      <p:sp>
-        <p:nvSpPr>
           <p:cNvPr id="3" name="Content Placeholder 2">
             <a:extLst>
               <a:ext uri="{FF2B5EF4-FFF2-40B4-BE49-F238E27FC236}">
@@ -13685,6 +14486,39 @@
           <a:p>
             <a:pPr lvl="2"/>
             <a:endParaRPr lang="en-US" dirty="0"/>
+          </a:p>
+        </p:txBody>
+      </p:sp>
+      <p:sp>
+        <p:nvSpPr>
+          <p:cNvPr id="8" name="Title 1">
+            <a:extLst>
+              <a:ext uri="{FF2B5EF4-FFF2-40B4-BE49-F238E27FC236}">
+                <a16:creationId xmlns:a16="http://schemas.microsoft.com/office/drawing/2014/main" id="{81898928-939F-41C1-9A5C-34467FB3D0EC}"/>
+              </a:ext>
+            </a:extLst>
+          </p:cNvPr>
+          <p:cNvSpPr>
+            <a:spLocks noGrp="1"/>
+          </p:cNvSpPr>
+          <p:nvPr>
+            <p:ph type="title"/>
+          </p:nvPr>
+        </p:nvSpPr>
+        <p:spPr>
+          <a:xfrm>
+            <a:off x="1143001" y="160638"/>
+            <a:ext cx="9905998" cy="865725"/>
+          </a:xfrm>
+        </p:spPr>
+        <p:txBody>
+          <a:bodyPr/>
+          <a:lstStyle/>
+          <a:p>
+            <a:r>
+              <a:rPr lang="en-US" dirty="0"/>
+              <a:t>PLC Programming</a:t>
+            </a:r>
           </a:p>
         </p:txBody>
       </p:sp>
@@ -13720,39 +14554,6 @@
       </p:grpSpPr>
       <p:sp>
         <p:nvSpPr>
-          <p:cNvPr id="2" name="Title 1">
-            <a:extLst>
-              <a:ext uri="{FF2B5EF4-FFF2-40B4-BE49-F238E27FC236}">
-                <a16:creationId xmlns:a16="http://schemas.microsoft.com/office/drawing/2014/main" id="{D3DD113A-D08D-47DF-A2B7-107369873155}"/>
-              </a:ext>
-            </a:extLst>
-          </p:cNvPr>
-          <p:cNvSpPr>
-            <a:spLocks noGrp="1"/>
-          </p:cNvSpPr>
-          <p:nvPr>
-            <p:ph type="title"/>
-          </p:nvPr>
-        </p:nvSpPr>
-        <p:spPr>
-          <a:xfrm>
-            <a:off x="1143001" y="160638"/>
-            <a:ext cx="9905998" cy="865725"/>
-          </a:xfrm>
-        </p:spPr>
-        <p:txBody>
-          <a:bodyPr/>
-          <a:lstStyle/>
-          <a:p>
-            <a:r>
-              <a:rPr lang="en-US" dirty="0"/>
-              <a:t>Intro to PLC Programming</a:t>
-            </a:r>
-          </a:p>
-        </p:txBody>
-      </p:sp>
-      <p:sp>
-        <p:nvSpPr>
           <p:cNvPr id="3" name="Content Placeholder 2">
             <a:extLst>
               <a:ext uri="{FF2B5EF4-FFF2-40B4-BE49-F238E27FC236}">
@@ -13779,24 +14580,69 @@
           </a:bodyPr>
           <a:lstStyle/>
           <a:p>
-            <a:pPr marL="0" indent="0" algn="ctr">
-              <a:buNone/>
-            </a:pPr>
-            <a:r>
-              <a:rPr lang="en-US" u="sng" dirty="0"/>
-              <a:t>Defining a Block of code for Omron CX-Programmer</a:t>
-            </a:r>
+            <a:r>
+              <a:rPr lang="en-US" dirty="0"/>
+              <a:t>Each PLC provides a different way of accessing bits</a:t>
+            </a:r>
+          </a:p>
+          <a:p>
+            <a:r>
+              <a:rPr lang="en-US" dirty="0"/>
+              <a:t>So it up to the individual programmer to develop the control structure to meet the hardware constraints.</a:t>
+            </a:r>
+          </a:p>
+          <a:p>
+            <a:r>
+              <a:rPr lang="en-US" dirty="0"/>
+              <a:t>The following slide will show 3 different implementation used in various PLC </a:t>
+            </a:r>
+          </a:p>
+          <a:p>
+            <a:endParaRPr lang="en-US" dirty="0"/>
           </a:p>
           <a:p>
             <a:pPr lvl="2"/>
             <a:endParaRPr lang="en-US" dirty="0"/>
+          </a:p>
+        </p:txBody>
+      </p:sp>
+      <p:sp>
+        <p:nvSpPr>
+          <p:cNvPr id="7" name="Title 1">
+            <a:extLst>
+              <a:ext uri="{FF2B5EF4-FFF2-40B4-BE49-F238E27FC236}">
+                <a16:creationId xmlns:a16="http://schemas.microsoft.com/office/drawing/2014/main" id="{B4A1A992-CFD1-42A0-95CE-C9CA7DA24840}"/>
+              </a:ext>
+            </a:extLst>
+          </p:cNvPr>
+          <p:cNvSpPr>
+            <a:spLocks noGrp="1"/>
+          </p:cNvSpPr>
+          <p:nvPr>
+            <p:ph type="title"/>
+          </p:nvPr>
+        </p:nvSpPr>
+        <p:spPr>
+          <a:xfrm>
+            <a:off x="1143001" y="160638"/>
+            <a:ext cx="9905998" cy="865725"/>
+          </a:xfrm>
+        </p:spPr>
+        <p:txBody>
+          <a:bodyPr/>
+          <a:lstStyle/>
+          <a:p>
+            <a:r>
+              <a:rPr lang="en-US" dirty="0"/>
+              <a:t>PLC Programming</a:t>
+            </a:r>
           </a:p>
         </p:txBody>
       </p:sp>
     </p:spTree>
     <p:extLst>
       <p:ext uri="{BB962C8B-B14F-4D97-AF65-F5344CB8AC3E}">
-        <p14:creationId xmlns:p14="http://schemas.microsoft.com/office/powerpoint/2010/main" val="1621327899"/>
+        <p14:creationId xmlns:p14="http://schemas.microsoft.com/office/powerpoint/2010/main" val="4258340579"/>
       </p:ext>
     </p:extLst>
   </p:cSld>
@@ -13825,39 +14671,6 @@
       </p:grpSpPr>
       <p:sp>
         <p:nvSpPr>
-          <p:cNvPr id="2" name="Title 1">
-            <a:extLst>
-              <a:ext uri="{FF2B5EF4-FFF2-40B4-BE49-F238E27FC236}">
-                <a16:creationId xmlns:a16="http://schemas.microsoft.com/office/drawing/2014/main" id="{D3DD113A-D08D-47DF-A2B7-107369873155}"/>
-              </a:ext>
-            </a:extLst>
-          </p:cNvPr>
-          <p:cNvSpPr>
-            <a:spLocks noGrp="1"/>
-          </p:cNvSpPr>
-          <p:nvPr>
-            <p:ph type="title"/>
-          </p:nvPr>
-        </p:nvSpPr>
-        <p:spPr>
-          <a:xfrm>
-            <a:off x="1143001" y="160638"/>
-            <a:ext cx="9905998" cy="865725"/>
-          </a:xfrm>
-        </p:spPr>
-        <p:txBody>
-          <a:bodyPr/>
-          <a:lstStyle/>
-          <a:p>
-            <a:r>
-              <a:rPr lang="en-US" dirty="0"/>
-              <a:t>Intro to PLC Programming</a:t>
-            </a:r>
-          </a:p>
-        </p:txBody>
-      </p:sp>
-      <p:sp>
-        <p:nvSpPr>
           <p:cNvPr id="3" name="Content Placeholder 2">
             <a:extLst>
               <a:ext uri="{FF2B5EF4-FFF2-40B4-BE49-F238E27FC236}">
@@ -13889,7 +14702,112 @@
             </a:pPr>
             <a:r>
               <a:rPr lang="en-US" u="sng" dirty="0"/>
-              <a:t>Defining a Block of code for Omron SYSMAC</a:t>
+              <a:t>Defining a Control Structure for Omron CX-Programmer</a:t>
+            </a:r>
+          </a:p>
+          <a:p>
+            <a:pPr lvl="2"/>
+            <a:endParaRPr lang="en-US" dirty="0"/>
+          </a:p>
+        </p:txBody>
+      </p:sp>
+      <p:sp>
+        <p:nvSpPr>
+          <p:cNvPr id="6" name="Title 1">
+            <a:extLst>
+              <a:ext uri="{FF2B5EF4-FFF2-40B4-BE49-F238E27FC236}">
+                <a16:creationId xmlns:a16="http://schemas.microsoft.com/office/drawing/2014/main" id="{9090C727-6DE9-4CA8-9920-6A49807BC601}"/>
+              </a:ext>
+            </a:extLst>
+          </p:cNvPr>
+          <p:cNvSpPr>
+            <a:spLocks noGrp="1"/>
+          </p:cNvSpPr>
+          <p:nvPr>
+            <p:ph type="title"/>
+          </p:nvPr>
+        </p:nvSpPr>
+        <p:spPr>
+          <a:xfrm>
+            <a:off x="1143001" y="160638"/>
+            <a:ext cx="9905998" cy="865725"/>
+          </a:xfrm>
+        </p:spPr>
+        <p:txBody>
+          <a:bodyPr/>
+          <a:lstStyle/>
+          <a:p>
+            <a:r>
+              <a:rPr lang="en-US" dirty="0"/>
+              <a:t>PLC Programming</a:t>
+            </a:r>
+          </a:p>
+        </p:txBody>
+      </p:sp>
+    </p:spTree>
+    <p:extLst>
+      <p:ext uri="{BB962C8B-B14F-4D97-AF65-F5344CB8AC3E}">
+        <p14:creationId xmlns:p14="http://schemas.microsoft.com/office/powerpoint/2010/main" val="1621327899"/>
+      </p:ext>
+    </p:extLst>
+  </p:cSld>
+  <p:clrMapOvr>
+    <a:masterClrMapping/>
+  </p:clrMapOvr>
+</p:sld>
+</file>
+
+<file path=ppt/slides/slide8.xml><?xml version="1.0" encoding="utf-8"?>
+<p:sld xmlns:a="http://schemas.openxmlformats.org/drawingml/2006/main" xmlns:r="http://schemas.openxmlformats.org/officeDocument/2006/relationships" xmlns:p="http://schemas.openxmlformats.org/presentationml/2006/main">
+  <p:cSld>
+    <p:spTree>
+      <p:nvGrpSpPr>
+        <p:cNvPr id="1" name=""/>
+        <p:cNvGrpSpPr/>
+        <p:nvPr/>
+      </p:nvGrpSpPr>
+      <p:grpSpPr>
+        <a:xfrm>
+          <a:off x="0" y="0"/>
+          <a:ext cx="0" cy="0"/>
+          <a:chOff x="0" y="0"/>
+          <a:chExt cx="0" cy="0"/>
+        </a:xfrm>
+      </p:grpSpPr>
+      <p:sp>
+        <p:nvSpPr>
+          <p:cNvPr id="3" name="Content Placeholder 2">
+            <a:extLst>
+              <a:ext uri="{FF2B5EF4-FFF2-40B4-BE49-F238E27FC236}">
+                <a16:creationId xmlns:a16="http://schemas.microsoft.com/office/drawing/2014/main" id="{5628BDDE-76AD-4EA1-B6ED-12752602D66B}"/>
+              </a:ext>
+            </a:extLst>
+          </p:cNvPr>
+          <p:cNvSpPr>
+            <a:spLocks noGrp="1"/>
+          </p:cNvSpPr>
+          <p:nvPr>
+            <p:ph idx="1"/>
+          </p:nvPr>
+        </p:nvSpPr>
+        <p:spPr>
+          <a:xfrm>
+            <a:off x="1143001" y="1026364"/>
+            <a:ext cx="9905999" cy="560390"/>
+          </a:xfrm>
+        </p:spPr>
+        <p:txBody>
+          <a:bodyPr>
+            <a:normAutofit/>
+          </a:bodyPr>
+          <a:lstStyle/>
+          <a:p>
+            <a:pPr marL="0" indent="0" algn="ctr">
+              <a:buNone/>
+            </a:pPr>
+            <a:r>
+              <a:rPr lang="en-US" u="sng" dirty="0"/>
+              <a:t>Defining a Control Structure for Omron SYSMAC</a:t>
             </a:r>
           </a:p>
           <a:p>
@@ -13928,42 +14846,81 @@
           </a:prstGeom>
         </p:spPr>
       </p:pic>
-    </p:spTree>
-    <p:extLst>
-      <p:ext uri="{BB962C8B-B14F-4D97-AF65-F5344CB8AC3E}">
-        <p14:creationId xmlns:p14="http://schemas.microsoft.com/office/powerpoint/2010/main" val="3354674121"/>
-      </p:ext>
-    </p:extLst>
-  </p:cSld>
-  <p:clrMapOvr>
-    <a:masterClrMapping/>
-  </p:clrMapOvr>
-</p:sld>
-</file>
-
-<file path=ppt/slides/slide8.xml><?xml version="1.0" encoding="utf-8"?>
-<p:sld xmlns:a="http://schemas.openxmlformats.org/drawingml/2006/main" xmlns:r="http://schemas.openxmlformats.org/officeDocument/2006/relationships" xmlns:p="http://schemas.openxmlformats.org/presentationml/2006/main">
-  <p:cSld>
-    <p:spTree>
-      <p:nvGrpSpPr>
-        <p:cNvPr id="1" name=""/>
-        <p:cNvGrpSpPr/>
-        <p:nvPr/>
-      </p:nvGrpSpPr>
-      <p:grpSpPr>
-        <a:xfrm>
-          <a:off x="0" y="0"/>
-          <a:ext cx="0" cy="0"/>
-          <a:chOff x="0" y="0"/>
-          <a:chExt cx="0" cy="0"/>
-        </a:xfrm>
-      </p:grpSpPr>
       <p:sp>
         <p:nvSpPr>
-          <p:cNvPr id="2" name="Title 1">
+          <p:cNvPr id="5" name="TextBox 4">
             <a:extLst>
               <a:ext uri="{FF2B5EF4-FFF2-40B4-BE49-F238E27FC236}">
-                <a16:creationId xmlns:a16="http://schemas.microsoft.com/office/drawing/2014/main" id="{D3DD113A-D08D-47DF-A2B7-107369873155}"/>
+                <a16:creationId xmlns:a16="http://schemas.microsoft.com/office/drawing/2014/main" id="{D8A512D3-4DA7-4518-8A08-7C112DBE95BE}"/>
+              </a:ext>
+            </a:extLst>
+          </p:cNvPr>
+          <p:cNvSpPr txBox="1"/>
+          <p:nvPr/>
+        </p:nvSpPr>
+        <p:spPr>
+          <a:xfrm>
+            <a:off x="6446982" y="1732190"/>
+            <a:ext cx="5139780" cy="2308324"/>
+          </a:xfrm>
+          <a:prstGeom prst="rect">
+            <a:avLst/>
+          </a:prstGeom>
+          <a:noFill/>
+        </p:spPr>
+        <p:txBody>
+          <a:bodyPr wrap="square" rtlCol="0">
+            <a:spAutoFit/>
+          </a:bodyPr>
+          <a:lstStyle/>
+          <a:p>
+            <a:pPr marL="285750" indent="-285750">
+              <a:buFont typeface="Arial" panose="020B0604020202020204" pitchFamily="34" charset="0"/>
+              <a:buChar char="•"/>
+            </a:pPr>
+            <a:r>
+              <a:rPr lang="en-US" dirty="0"/>
+              <a:t>In the SYSMAC environment</a:t>
+            </a:r>
+          </a:p>
+          <a:p>
+            <a:pPr marL="742950" lvl="1" indent="-285750">
+              <a:buFont typeface="Arial" panose="020B0604020202020204" pitchFamily="34" charset="0"/>
+              <a:buChar char="•"/>
+            </a:pPr>
+            <a:r>
+              <a:rPr lang="en-US" dirty="0"/>
+              <a:t>The use of Union was the best way I found to access the BITS in a WORD</a:t>
+            </a:r>
+          </a:p>
+          <a:p>
+            <a:pPr marL="742950" lvl="1" indent="-285750">
+              <a:buFont typeface="Arial" panose="020B0604020202020204" pitchFamily="34" charset="0"/>
+              <a:buChar char="•"/>
+            </a:pPr>
+            <a:r>
+              <a:rPr lang="en-US" dirty="0"/>
+              <a:t>Since a Union is a set of variables with same offset therefore occupies the same memory space.</a:t>
+            </a:r>
+          </a:p>
+          <a:p>
+            <a:pPr marL="742950" lvl="1" indent="-285750">
+              <a:buFont typeface="Arial" panose="020B0604020202020204" pitchFamily="34" charset="0"/>
+              <a:buChar char="•"/>
+            </a:pPr>
+            <a:r>
+              <a:rPr lang="en-US" dirty="0"/>
+              <a:t>Hence, b is array of 16 Boolean that can directly access the bits in the WORD.</a:t>
+            </a:r>
+          </a:p>
+        </p:txBody>
+      </p:sp>
+      <p:sp>
+        <p:nvSpPr>
+          <p:cNvPr id="8" name="Title 1">
+            <a:extLst>
+              <a:ext uri="{FF2B5EF4-FFF2-40B4-BE49-F238E27FC236}">
+                <a16:creationId xmlns:a16="http://schemas.microsoft.com/office/drawing/2014/main" id="{DCD4C83C-D716-489F-BBE8-4578766548AE}"/>
               </a:ext>
             </a:extLst>
           </p:cNvPr>
@@ -13986,87 +14943,15 @@
           <a:p>
             <a:r>
               <a:rPr lang="en-US" dirty="0"/>
-              <a:t>Intro to PLC Programming</a:t>
+              <a:t>PLC Programming</a:t>
             </a:r>
           </a:p>
         </p:txBody>
       </p:sp>
-      <p:sp>
-        <p:nvSpPr>
-          <p:cNvPr id="3" name="Content Placeholder 2">
-            <a:extLst>
-              <a:ext uri="{FF2B5EF4-FFF2-40B4-BE49-F238E27FC236}">
-                <a16:creationId xmlns:a16="http://schemas.microsoft.com/office/drawing/2014/main" id="{5628BDDE-76AD-4EA1-B6ED-12752602D66B}"/>
-              </a:ext>
-            </a:extLst>
-          </p:cNvPr>
-          <p:cNvSpPr>
-            <a:spLocks noGrp="1"/>
-          </p:cNvSpPr>
-          <p:nvPr>
-            <p:ph idx="1"/>
-          </p:nvPr>
-        </p:nvSpPr>
-        <p:spPr>
-          <a:xfrm>
-            <a:off x="1143001" y="1026363"/>
-            <a:ext cx="9905999" cy="5670999"/>
-          </a:xfrm>
-        </p:spPr>
-        <p:txBody>
-          <a:bodyPr>
-            <a:normAutofit/>
-          </a:bodyPr>
-          <a:lstStyle/>
-          <a:p>
-            <a:pPr marL="0" indent="0" algn="ctr">
-              <a:buNone/>
-            </a:pPr>
-            <a:r>
-              <a:rPr lang="en-US" u="sng" dirty="0"/>
-              <a:t>Defining a Block of code for Omron SYSMAC</a:t>
-            </a:r>
-          </a:p>
-          <a:p>
-            <a:pPr lvl="2"/>
-            <a:endParaRPr lang="en-US" dirty="0"/>
-          </a:p>
-        </p:txBody>
-      </p:sp>
-      <p:pic>
-        <p:nvPicPr>
-          <p:cNvPr id="5" name="Picture 4">
-            <a:extLst>
-              <a:ext uri="{FF2B5EF4-FFF2-40B4-BE49-F238E27FC236}">
-                <a16:creationId xmlns:a16="http://schemas.microsoft.com/office/drawing/2014/main" id="{17EA7108-F19F-491D-8595-58F95C0D7373}"/>
-              </a:ext>
-            </a:extLst>
-          </p:cNvPr>
-          <p:cNvPicPr>
-            <a:picLocks noChangeAspect="1"/>
-          </p:cNvPicPr>
-          <p:nvPr/>
-        </p:nvPicPr>
-        <p:blipFill>
-          <a:blip r:embed="rId2"/>
-          <a:stretch>
-            <a:fillRect/>
-          </a:stretch>
-        </p:blipFill>
-        <p:spPr>
-          <a:xfrm>
-            <a:off x="972336" y="1668137"/>
-            <a:ext cx="5967147" cy="3521725"/>
-          </a:xfrm>
-          <a:prstGeom prst="rect">
-            <a:avLst/>
-          </a:prstGeom>
-        </p:spPr>
-      </p:pic>
     </p:spTree>
     <p:extLst>
       <p:ext uri="{BB962C8B-B14F-4D97-AF65-F5344CB8AC3E}">
-        <p14:creationId xmlns:p14="http://schemas.microsoft.com/office/powerpoint/2010/main" val="2300074561"/>
+        <p14:creationId xmlns:p14="http://schemas.microsoft.com/office/powerpoint/2010/main" val="3354674121"/>
       </p:ext>
     </p:extLst>
   </p:cSld>
@@ -14095,42 +14980,6 @@
       </p:grpSpPr>
       <p:sp>
         <p:nvSpPr>
-          <p:cNvPr id="2" name="Title 1">
-            <a:extLst>
-              <a:ext uri="{FF2B5EF4-FFF2-40B4-BE49-F238E27FC236}">
-                <a16:creationId xmlns:a16="http://schemas.microsoft.com/office/drawing/2014/main" id="{D3DD113A-D08D-47DF-A2B7-107369873155}"/>
-              </a:ext>
-            </a:extLst>
-          </p:cNvPr>
-          <p:cNvSpPr>
-            <a:spLocks noGrp="1"/>
-          </p:cNvSpPr>
-          <p:nvPr>
-            <p:ph type="title"/>
-          </p:nvPr>
-        </p:nvSpPr>
-        <p:spPr>
-          <a:xfrm>
-            <a:off x="1249891" y="277091"/>
-            <a:ext cx="9905998" cy="720870"/>
-          </a:xfrm>
-        </p:spPr>
-        <p:txBody>
-          <a:bodyPr>
-            <a:normAutofit/>
-          </a:bodyPr>
-          <a:lstStyle/>
-          <a:p>
-            <a:pPr algn="ctr"/>
-            <a:r>
-              <a:rPr lang="en-US" dirty="0"/>
-              <a:t>Intro to PLC Programming</a:t>
-            </a:r>
-          </a:p>
-        </p:txBody>
-      </p:sp>
-      <p:sp>
-        <p:nvSpPr>
           <p:cNvPr id="3" name="Content Placeholder 2">
             <a:extLst>
               <a:ext uri="{FF2B5EF4-FFF2-40B4-BE49-F238E27FC236}">
@@ -14147,40 +14996,36 @@
         </p:nvSpPr>
         <p:spPr>
           <a:xfrm>
-            <a:off x="2598759" y="997961"/>
-            <a:ext cx="7208261" cy="438210"/>
+            <a:off x="1143001" y="1026363"/>
+            <a:ext cx="9905999" cy="5670999"/>
           </a:xfrm>
         </p:spPr>
         <p:txBody>
-          <a:bodyPr anchor="ctr">
-            <a:normAutofit fontScale="92500" lnSpcReduction="20000"/>
+          <a:bodyPr>
+            <a:normAutofit/>
           </a:bodyPr>
           <a:lstStyle/>
           <a:p>
-            <a:pPr marL="0" indent="0">
+            <a:pPr marL="0" indent="0" algn="ctr">
               <a:buNone/>
             </a:pPr>
             <a:r>
               <a:rPr lang="en-US" u="sng" dirty="0"/>
-              <a:t>Defining a Block of code for </a:t>
-            </a:r>
-            <a:r>
-              <a:rPr lang="en-US" u="sng" dirty="0" err="1"/>
-              <a:t>Kollmorgen</a:t>
-            </a:r>
-            <a:r>
-              <a:rPr lang="en-US" u="sng" dirty="0"/>
-              <a:t> Automation Suite</a:t>
-            </a:r>
+              <a:t>Defining a Control Structure for Omron SYSMAC</a:t>
+            </a:r>
+          </a:p>
+          <a:p>
+            <a:pPr lvl="2"/>
+            <a:endParaRPr lang="en-US" dirty="0"/>
           </a:p>
         </p:txBody>
       </p:sp>
       <p:pic>
         <p:nvPicPr>
-          <p:cNvPr id="7" name="Picture 6" descr="Diagram&#10;&#10;Description automatically generated">
+          <p:cNvPr id="5" name="Picture 4">
             <a:extLst>
               <a:ext uri="{FF2B5EF4-FFF2-40B4-BE49-F238E27FC236}">
-                <a16:creationId xmlns:a16="http://schemas.microsoft.com/office/drawing/2014/main" id="{48E1FF95-C875-40B7-B73E-FF2DF855BFDA}"/>
+                <a16:creationId xmlns:a16="http://schemas.microsoft.com/office/drawing/2014/main" id="{17EA7108-F19F-491D-8595-58F95C0D7373}"/>
               </a:ext>
             </a:extLst>
           </p:cNvPr>
@@ -14197,8 +15042,8 @@
         </p:blipFill>
         <p:spPr>
           <a:xfrm>
-            <a:off x="873281" y="1718830"/>
-            <a:ext cx="5297001" cy="3056369"/>
+            <a:off x="795079" y="1668138"/>
+            <a:ext cx="5284804" cy="3119016"/>
           </a:xfrm>
           <a:prstGeom prst="rect">
             <a:avLst/>
@@ -14207,10 +15052,10 @@
       </p:pic>
       <p:sp>
         <p:nvSpPr>
-          <p:cNvPr id="8" name="TextBox 7">
+          <p:cNvPr id="6" name="TextBox 5">
             <a:extLst>
               <a:ext uri="{FF2B5EF4-FFF2-40B4-BE49-F238E27FC236}">
-                <a16:creationId xmlns:a16="http://schemas.microsoft.com/office/drawing/2014/main" id="{5A58CF2E-14AA-479D-A910-F46C32BF89A5}"/>
+                <a16:creationId xmlns:a16="http://schemas.microsoft.com/office/drawing/2014/main" id="{AA00E37E-B632-4FCE-AA4F-DAC47FA7A3BF}"/>
               </a:ext>
             </a:extLst>
           </p:cNvPr>
@@ -14219,8 +15064,8 @@
         </p:nvSpPr>
         <p:spPr>
           <a:xfrm>
-            <a:off x="6446982" y="1732190"/>
-            <a:ext cx="4461163" cy="4801314"/>
+            <a:off x="6257141" y="1668138"/>
+            <a:ext cx="5139780" cy="4801314"/>
           </a:xfrm>
           <a:prstGeom prst="rect">
             <a:avLst/>
@@ -14238,44 +15083,8 @@
               <a:buChar char="•"/>
             </a:pPr>
             <a:r>
-              <a:rPr lang="en-US" dirty="0" err="1"/>
-              <a:t>LeftFoilOn</a:t>
-            </a:r>
-            <a:r>
               <a:rPr lang="en-US" dirty="0"/>
-              <a:t>[x] is an array of 16 bool</a:t>
-            </a:r>
-          </a:p>
-          <a:p>
-            <a:pPr marL="285750" indent="-285750">
-              <a:buFont typeface="Arial" panose="020B0604020202020204" pitchFamily="34" charset="0"/>
-              <a:buChar char="•"/>
-            </a:pPr>
-            <a:r>
-              <a:rPr lang="en-US" dirty="0" err="1"/>
-              <a:t>LeftFoilOn</a:t>
-            </a:r>
-            <a:r>
-              <a:rPr lang="en-US" dirty="0"/>
-              <a:t>[0] is the Enabling bit</a:t>
-            </a:r>
-          </a:p>
-          <a:p>
-            <a:pPr marL="285750" indent="-285750">
-              <a:buFont typeface="Arial" panose="020B0604020202020204" pitchFamily="34" charset="0"/>
-              <a:buChar char="•"/>
-            </a:pPr>
-            <a:r>
-              <a:rPr lang="en-US" dirty="0"/>
-              <a:t>If </a:t>
-            </a:r>
-            <a:r>
-              <a:rPr lang="en-US" dirty="0" err="1"/>
-              <a:t>LeftFoilOn</a:t>
-            </a:r>
-            <a:r>
-              <a:rPr lang="en-US" dirty="0"/>
-              <a:t>[0] is Off the </a:t>
+              <a:t>In the SYSMAC environment</a:t>
             </a:r>
           </a:p>
           <a:p>
@@ -14285,15 +15094,7 @@
             </a:pPr>
             <a:r>
               <a:rPr lang="en-US" dirty="0"/>
-              <a:t>--&gt;&gt; </a:t>
-            </a:r>
-            <a:r>
-              <a:rPr lang="en-US" dirty="0" err="1"/>
-              <a:t>LeftFoilAitOn_End</a:t>
-            </a:r>
-            <a:r>
-              <a:rPr lang="en-US" dirty="0"/>
-              <a:t> is the Jump Statement that bypasses this Network of code.</a:t>
+              <a:t>This the basic control structure that was developed.</a:t>
             </a:r>
           </a:p>
           <a:p>
@@ -14302,86 +15103,124 @@
               <a:buChar char="•"/>
             </a:pPr>
             <a:r>
+              <a:rPr lang="en-US" dirty="0" err="1"/>
+              <a:t>Y_Slide_Up</a:t>
+            </a:r>
+            <a:r>
               <a:rPr lang="en-US" dirty="0"/>
-              <a:t>On Network #2: </a:t>
+              <a:t> variable is defined by Union definition in the previous screen call </a:t>
             </a:r>
             <a:r>
               <a:rPr lang="en-US" dirty="0" err="1"/>
-              <a:t>LeftFoilAirOn_End</a:t>
-            </a:r>
-            <a:r>
-              <a:rPr lang="en-US" dirty="0"/>
-              <a:t> is the label that the Jump statement refers to.</a:t>
-            </a:r>
-          </a:p>
-          <a:p>
-            <a:pPr marL="285750" indent="-285750">
+              <a:t>CntrlSeq</a:t>
+            </a:r>
+            <a:endParaRPr lang="en-US" dirty="0"/>
+          </a:p>
+          <a:p>
+            <a:pPr marL="742950" lvl="1" indent="-285750">
               <a:buFont typeface="Arial" panose="020B0604020202020204" pitchFamily="34" charset="0"/>
               <a:buChar char="•"/>
             </a:pPr>
             <a:r>
               <a:rPr lang="en-US" dirty="0"/>
-              <a:t>The </a:t>
-            </a:r>
-            <a:r>
-              <a:rPr lang="en-US" u="sng" dirty="0"/>
-              <a:t>Reset16BitArray</a:t>
-            </a:r>
-            <a:r>
-              <a:rPr lang="en-US" dirty="0"/>
-              <a:t> function block is used to reset the individual bits in the array</a:t>
-            </a:r>
-          </a:p>
-          <a:p>
-            <a:pPr marL="285750" indent="-285750">
+              <a:t>Bit 0 is the enabling bit</a:t>
+            </a:r>
+          </a:p>
+          <a:p>
+            <a:pPr marL="742950" lvl="1" indent="-285750">
               <a:buFont typeface="Arial" panose="020B0604020202020204" pitchFamily="34" charset="0"/>
               <a:buChar char="•"/>
             </a:pPr>
             <a:r>
-              <a:rPr lang="en-US" dirty="0" err="1"/>
-              <a:t>LeftFoilOn</a:t>
-            </a:r>
-            <a:r>
               <a:rPr lang="en-US" dirty="0"/>
-              <a:t>[1] is the starting bit for the block of code</a:t>
-            </a:r>
-          </a:p>
-          <a:p>
-            <a:pPr marL="285750" indent="-285750">
+              <a:t>If the Bit 0 is off, jump statement is enable and takes the execution of PLC code to the end of the control structure</a:t>
+            </a:r>
+          </a:p>
+          <a:p>
+            <a:pPr marL="742950" lvl="1" indent="-285750">
               <a:buFont typeface="Arial" panose="020B0604020202020204" pitchFamily="34" charset="0"/>
               <a:buChar char="•"/>
             </a:pPr>
             <a:r>
+              <a:rPr lang="en-US" dirty="0"/>
+              <a:t>Bit 1 is the Starting bit</a:t>
+            </a:r>
+          </a:p>
+          <a:p>
+            <a:pPr marL="742950" lvl="1" indent="-285750">
+              <a:buFont typeface="Arial" panose="020B0604020202020204" pitchFamily="34" charset="0"/>
+              <a:buChar char="•"/>
+            </a:pPr>
+            <a:r>
               <a:rPr lang="en-US" dirty="0" err="1"/>
-              <a:t>LeftFoilOn</a:t>
+              <a:t>Y_Slide_Up.b</a:t>
             </a:r>
             <a:r>
               <a:rPr lang="en-US" dirty="0"/>
-              <a:t>[1] rung sets an output variable “</a:t>
+              <a:t>(1) rung sets an output variable “E009_Out_Bit01” then proceed to reset the current rung </a:t>
             </a:r>
             <a:r>
               <a:rPr lang="en-US" dirty="0" err="1"/>
-              <a:t>Outputs_LeftFoilPlattenAir</a:t>
+              <a:t>Y_Slide_Up.b</a:t>
             </a:r>
             <a:r>
               <a:rPr lang="en-US" dirty="0"/>
-              <a:t>” then proceed to reset the current rung </a:t>
+              <a:t>(1) then set the next rung </a:t>
             </a:r>
             <a:r>
               <a:rPr lang="en-US" dirty="0" err="1"/>
-              <a:t>LeftFoilOn</a:t>
+              <a:t>Y_Slide_Up.b</a:t>
             </a:r>
             <a:r>
               <a:rPr lang="en-US" dirty="0"/>
-              <a:t>[1] then set the next rung </a:t>
-            </a:r>
+              <a:t>(2) .</a:t>
+            </a:r>
+          </a:p>
+          <a:p>
+            <a:pPr marL="742950" lvl="1" indent="-285750">
+              <a:buFont typeface="Arial" panose="020B0604020202020204" pitchFamily="34" charset="0"/>
+              <a:buChar char="•"/>
+            </a:pPr>
             <a:r>
               <a:rPr lang="en-US" dirty="0" err="1"/>
-              <a:t>LeftFoilOn</a:t>
+              <a:t>Y_Slide_Up.b</a:t>
             </a:r>
             <a:r>
               <a:rPr lang="en-US" dirty="0"/>
-              <a:t>[2].</a:t>
+              <a:t>(2) Rung enables a Timer On function block defined by time variable T#300ms.</a:t>
+            </a:r>
+          </a:p>
+        </p:txBody>
+      </p:sp>
+      <p:sp>
+        <p:nvSpPr>
+          <p:cNvPr id="8" name="Title 1">
+            <a:extLst>
+              <a:ext uri="{FF2B5EF4-FFF2-40B4-BE49-F238E27FC236}">
+                <a16:creationId xmlns:a16="http://schemas.microsoft.com/office/drawing/2014/main" id="{3B71B842-B63B-4D55-8865-01D9AA0CBB0E}"/>
+              </a:ext>
+            </a:extLst>
+          </p:cNvPr>
+          <p:cNvSpPr>
+            <a:spLocks noGrp="1"/>
+          </p:cNvSpPr>
+          <p:nvPr>
+            <p:ph type="title"/>
+          </p:nvPr>
+        </p:nvSpPr>
+        <p:spPr>
+          <a:xfrm>
+            <a:off x="1143001" y="160638"/>
+            <a:ext cx="9905998" cy="865725"/>
+          </a:xfrm>
+        </p:spPr>
+        <p:txBody>
+          <a:bodyPr/>
+          <a:lstStyle/>
+          <a:p>
+            <a:r>
+              <a:rPr lang="en-US" dirty="0"/>
+              <a:t>PLC Programming</a:t>
             </a:r>
           </a:p>
         </p:txBody>
@@ -14389,7 +15228,7 @@
     </p:spTree>
     <p:extLst>
       <p:ext uri="{BB962C8B-B14F-4D97-AF65-F5344CB8AC3E}">
-        <p14:creationId xmlns:p14="http://schemas.microsoft.com/office/powerpoint/2010/main" val="3369755779"/>
+        <p14:creationId xmlns:p14="http://schemas.microsoft.com/office/powerpoint/2010/main" val="2300074561"/>
       </p:ext>
     </p:extLst>
   </p:cSld>

</xml_diff>